<commit_message>
before applying model testing in depth
</commit_message>
<xml_diff>
--- a/Final/Presentation.pptx
+++ b/Final/Presentation.pptx
@@ -124,3049 +124,10 @@
 <p1510:revInfo xmlns:a="http://schemas.openxmlformats.org/drawingml/2006/main" xmlns:r="http://schemas.openxmlformats.org/officeDocument/2006/relationships" xmlns:p1510="http://schemas.microsoft.com/office/powerpoint/2015/10/main">
   <p1510:revLst>
     <p1510:client id="{141B0415-9CE5-F876-C9AB-21F4492C8DA7}" v="50" dt="2024-12-04T19:46:51.512"/>
+    <p1510:client id="{37F8CC3E-5FBE-7E66-8D5E-D339E1F4EDFA}" v="213" dt="2024-12-04T21:52:50.573"/>
     <p1510:client id="{D0974D6E-0051-2BA6-98BD-752BF2649534}" v="96" dt="2024-12-03T18:31:29.244"/>
   </p1510:revLst>
 </p1510:revInfo>
-</file>
-
-<file path=ppt/diagrams/colors1.xml><?xml version="1.0" encoding="utf-8"?>
-<dgm:colorsDef xmlns:dgm="http://schemas.openxmlformats.org/drawingml/2006/diagram" xmlns:a="http://schemas.openxmlformats.org/drawingml/2006/main" uniqueId="urn:microsoft.com/office/officeart/2018/5/colors/Iconchunking_neutralbg_colorful1">
-  <dgm:title val=""/>
-  <dgm:desc val=""/>
-  <dgm:catLst>
-    <dgm:cat type="colorful" pri="10100"/>
-  </dgm:catLst>
-  <dgm:styleLbl name="node0">
-    <dgm:fillClrLst meth="repeat">
-      <a:schemeClr val="accent1"/>
-    </dgm:fillClrLst>
-    <dgm:linClrLst meth="repeat">
-      <a:schemeClr val="lt1"/>
-    </dgm:linClrLst>
-    <dgm:effectClrLst/>
-    <dgm:txLinClrLst/>
-    <dgm:txFillClrLst/>
-    <dgm:txEffectClrLst/>
-  </dgm:styleLbl>
-  <dgm:styleLbl name="node1">
-    <dgm:fillClrLst meth="repeat">
-      <a:schemeClr val="accent2"/>
-      <a:schemeClr val="accent3"/>
-      <a:schemeClr val="accent4"/>
-      <a:schemeClr val="accent5"/>
-      <a:schemeClr val="accent6"/>
-    </dgm:fillClrLst>
-    <dgm:linClrLst meth="repeat">
-      <a:schemeClr val="lt1">
-        <a:alpha val="0"/>
-      </a:schemeClr>
-    </dgm:linClrLst>
-    <dgm:effectClrLst/>
-    <dgm:txLinClrLst/>
-    <dgm:txFillClrLst/>
-    <dgm:txEffectClrLst/>
-  </dgm:styleLbl>
-  <dgm:styleLbl name="alignNode1">
-    <dgm:fillClrLst meth="repeat">
-      <a:schemeClr val="accent2"/>
-      <a:schemeClr val="accent3"/>
-      <a:schemeClr val="accent4"/>
-      <a:schemeClr val="accent5"/>
-      <a:schemeClr val="accent6"/>
-    </dgm:fillClrLst>
-    <dgm:linClrLst meth="repeat">
-      <a:schemeClr val="accent2"/>
-      <a:schemeClr val="accent3"/>
-      <a:schemeClr val="accent4"/>
-      <a:schemeClr val="accent5"/>
-      <a:schemeClr val="accent6"/>
-    </dgm:linClrLst>
-    <dgm:effectClrLst/>
-    <dgm:txLinClrLst/>
-    <dgm:txFillClrLst/>
-    <dgm:txEffectClrLst/>
-  </dgm:styleLbl>
-  <dgm:styleLbl name="lnNode1">
-    <dgm:fillClrLst meth="repeat">
-      <a:schemeClr val="accent2"/>
-      <a:schemeClr val="accent3"/>
-      <a:schemeClr val="accent4"/>
-      <a:schemeClr val="accent5"/>
-      <a:schemeClr val="accent6"/>
-    </dgm:fillClrLst>
-    <dgm:linClrLst meth="repeat">
-      <a:schemeClr val="lt1"/>
-    </dgm:linClrLst>
-    <dgm:effectClrLst/>
-    <dgm:txLinClrLst/>
-    <dgm:txFillClrLst/>
-    <dgm:txEffectClrLst/>
-  </dgm:styleLbl>
-  <dgm:styleLbl name="vennNode1">
-    <dgm:fillClrLst meth="repeat">
-      <a:schemeClr val="accent2">
-        <a:alpha val="50000"/>
-      </a:schemeClr>
-      <a:schemeClr val="accent3">
-        <a:alpha val="50000"/>
-      </a:schemeClr>
-      <a:schemeClr val="accent4">
-        <a:alpha val="50000"/>
-      </a:schemeClr>
-      <a:schemeClr val="accent5">
-        <a:alpha val="50000"/>
-      </a:schemeClr>
-      <a:schemeClr val="accent6">
-        <a:alpha val="50000"/>
-      </a:schemeClr>
-    </dgm:fillClrLst>
-    <dgm:linClrLst meth="repeat">
-      <a:schemeClr val="lt1"/>
-    </dgm:linClrLst>
-    <dgm:effectClrLst/>
-    <dgm:txLinClrLst/>
-    <dgm:txFillClrLst/>
-    <dgm:txEffectClrLst/>
-  </dgm:styleLbl>
-  <dgm:styleLbl name="node2">
-    <dgm:fillClrLst>
-      <a:schemeClr val="accent2"/>
-    </dgm:fillClrLst>
-    <dgm:linClrLst meth="repeat">
-      <a:schemeClr val="lt1"/>
-    </dgm:linClrLst>
-    <dgm:effectClrLst/>
-    <dgm:txLinClrLst/>
-    <dgm:txFillClrLst/>
-    <dgm:txEffectClrLst/>
-  </dgm:styleLbl>
-  <dgm:styleLbl name="node3">
-    <dgm:fillClrLst>
-      <a:schemeClr val="accent3"/>
-    </dgm:fillClrLst>
-    <dgm:linClrLst meth="repeat">
-      <a:schemeClr val="lt1"/>
-    </dgm:linClrLst>
-    <dgm:effectClrLst/>
-    <dgm:txLinClrLst/>
-    <dgm:txFillClrLst/>
-    <dgm:txEffectClrLst/>
-  </dgm:styleLbl>
-  <dgm:styleLbl name="node4">
-    <dgm:fillClrLst>
-      <a:schemeClr val="accent4"/>
-    </dgm:fillClrLst>
-    <dgm:linClrLst meth="repeat">
-      <a:schemeClr val="lt1"/>
-    </dgm:linClrLst>
-    <dgm:effectClrLst/>
-    <dgm:txLinClrLst/>
-    <dgm:txFillClrLst/>
-    <dgm:txEffectClrLst/>
-  </dgm:styleLbl>
-  <dgm:styleLbl name="fgImgPlace1">
-    <dgm:fillClrLst meth="repeat">
-      <a:schemeClr val="accent2">
-        <a:tint val="50000"/>
-      </a:schemeClr>
-      <a:schemeClr val="accent3">
-        <a:tint val="50000"/>
-      </a:schemeClr>
-      <a:schemeClr val="accent4">
-        <a:tint val="50000"/>
-      </a:schemeClr>
-      <a:schemeClr val="accent5">
-        <a:tint val="50000"/>
-      </a:schemeClr>
-      <a:schemeClr val="accent6">
-        <a:tint val="50000"/>
-      </a:schemeClr>
-    </dgm:fillClrLst>
-    <dgm:linClrLst meth="repeat">
-      <a:schemeClr val="lt1"/>
-    </dgm:linClrLst>
-    <dgm:effectClrLst/>
-    <dgm:txLinClrLst/>
-    <dgm:txFillClrLst meth="repeat">
-      <a:schemeClr val="lt1"/>
-    </dgm:txFillClrLst>
-    <dgm:txEffectClrLst/>
-  </dgm:styleLbl>
-  <dgm:styleLbl name="alignImgPlace1">
-    <dgm:fillClrLst>
-      <a:schemeClr val="accent1">
-        <a:tint val="50000"/>
-      </a:schemeClr>
-      <a:schemeClr val="accent2">
-        <a:tint val="20000"/>
-      </a:schemeClr>
-    </dgm:fillClrLst>
-    <dgm:linClrLst meth="repeat">
-      <a:schemeClr val="lt1"/>
-    </dgm:linClrLst>
-    <dgm:effectClrLst/>
-    <dgm:txLinClrLst/>
-    <dgm:txFillClrLst meth="repeat">
-      <a:schemeClr val="lt1"/>
-    </dgm:txFillClrLst>
-    <dgm:txEffectClrLst/>
-  </dgm:styleLbl>
-  <dgm:styleLbl name="bgImgPlace1">
-    <dgm:fillClrLst>
-      <a:schemeClr val="accent1">
-        <a:tint val="50000"/>
-      </a:schemeClr>
-      <a:schemeClr val="accent2">
-        <a:tint val="20000"/>
-      </a:schemeClr>
-    </dgm:fillClrLst>
-    <dgm:linClrLst meth="repeat">
-      <a:schemeClr val="lt1"/>
-    </dgm:linClrLst>
-    <dgm:effectClrLst/>
-    <dgm:txLinClrLst/>
-    <dgm:txFillClrLst meth="repeat">
-      <a:schemeClr val="lt1"/>
-    </dgm:txFillClrLst>
-    <dgm:txEffectClrLst/>
-  </dgm:styleLbl>
-  <dgm:styleLbl name="sibTrans2D1">
-    <dgm:fillClrLst meth="repeat">
-      <a:schemeClr val="accent2"/>
-      <a:schemeClr val="accent3"/>
-      <a:schemeClr val="accent4"/>
-      <a:schemeClr val="accent5"/>
-      <a:schemeClr val="accent6"/>
-    </dgm:fillClrLst>
-    <dgm:linClrLst meth="cycle">
-      <a:schemeClr val="lt1"/>
-    </dgm:linClrLst>
-    <dgm:effectClrLst/>
-    <dgm:txLinClrLst/>
-    <dgm:txFillClrLst/>
-    <dgm:txEffectClrLst/>
-  </dgm:styleLbl>
-  <dgm:styleLbl name="fgSibTrans2D1">
-    <dgm:fillClrLst meth="repeat">
-      <a:schemeClr val="accent2"/>
-      <a:schemeClr val="accent3"/>
-      <a:schemeClr val="accent4"/>
-      <a:schemeClr val="accent5"/>
-      <a:schemeClr val="accent6"/>
-    </dgm:fillClrLst>
-    <dgm:linClrLst meth="cycle">
-      <a:schemeClr val="lt1"/>
-    </dgm:linClrLst>
-    <dgm:effectClrLst/>
-    <dgm:txLinClrLst/>
-    <dgm:txFillClrLst meth="repeat">
-      <a:schemeClr val="lt1"/>
-    </dgm:txFillClrLst>
-    <dgm:txEffectClrLst/>
-  </dgm:styleLbl>
-  <dgm:styleLbl name="bgSibTrans2D1">
-    <dgm:fillClrLst meth="repeat">
-      <a:schemeClr val="accent2"/>
-      <a:schemeClr val="accent3"/>
-      <a:schemeClr val="accent4"/>
-      <a:schemeClr val="accent5"/>
-      <a:schemeClr val="accent6"/>
-    </dgm:fillClrLst>
-    <dgm:linClrLst meth="cycle">
-      <a:schemeClr val="lt1"/>
-    </dgm:linClrLst>
-    <dgm:effectClrLst/>
-    <dgm:txLinClrLst/>
-    <dgm:txFillClrLst meth="repeat">
-      <a:schemeClr val="lt1"/>
-    </dgm:txFillClrLst>
-    <dgm:txEffectClrLst/>
-  </dgm:styleLbl>
-  <dgm:styleLbl name="sibTrans1D1">
-    <dgm:fillClrLst meth="repeat">
-      <a:schemeClr val="accent2"/>
-      <a:schemeClr val="accent3"/>
-      <a:schemeClr val="accent4"/>
-      <a:schemeClr val="accent5"/>
-      <a:schemeClr val="accent6"/>
-    </dgm:fillClrLst>
-    <dgm:linClrLst meth="repeat">
-      <a:schemeClr val="accent2"/>
-      <a:schemeClr val="accent3"/>
-      <a:schemeClr val="accent4"/>
-      <a:schemeClr val="accent5"/>
-      <a:schemeClr val="accent6"/>
-    </dgm:linClrLst>
-    <dgm:effectClrLst/>
-    <dgm:txLinClrLst/>
-    <dgm:txFillClrLst meth="repeat">
-      <a:schemeClr val="tx1"/>
-    </dgm:txFillClrLst>
-    <dgm:txEffectClrLst/>
-  </dgm:styleLbl>
-  <dgm:styleLbl name="callout">
-    <dgm:fillClrLst meth="repeat">
-      <a:schemeClr val="accent2"/>
-    </dgm:fillClrLst>
-    <dgm:linClrLst meth="repeat">
-      <a:schemeClr val="accent2">
-        <a:tint val="50000"/>
-      </a:schemeClr>
-    </dgm:linClrLst>
-    <dgm:effectClrLst/>
-    <dgm:txLinClrLst/>
-    <dgm:txFillClrLst meth="repeat">
-      <a:schemeClr val="tx1"/>
-    </dgm:txFillClrLst>
-    <dgm:txEffectClrLst/>
-  </dgm:styleLbl>
-  <dgm:styleLbl name="asst0">
-    <dgm:fillClrLst meth="repeat">
-      <a:schemeClr val="accent1"/>
-    </dgm:fillClrLst>
-    <dgm:linClrLst meth="repeat">
-      <a:schemeClr val="lt1"/>
-    </dgm:linClrLst>
-    <dgm:effectClrLst/>
-    <dgm:txLinClrLst/>
-    <dgm:txFillClrLst/>
-    <dgm:txEffectClrLst/>
-  </dgm:styleLbl>
-  <dgm:styleLbl name="asst1">
-    <dgm:fillClrLst meth="repeat">
-      <a:schemeClr val="accent2"/>
-    </dgm:fillClrLst>
-    <dgm:linClrLst meth="repeat">
-      <a:schemeClr val="lt1"/>
-    </dgm:linClrLst>
-    <dgm:effectClrLst/>
-    <dgm:txLinClrLst/>
-    <dgm:txFillClrLst/>
-    <dgm:txEffectClrLst/>
-  </dgm:styleLbl>
-  <dgm:styleLbl name="asst2">
-    <dgm:fillClrLst>
-      <a:schemeClr val="accent3"/>
-    </dgm:fillClrLst>
-    <dgm:linClrLst meth="repeat">
-      <a:schemeClr val="lt1"/>
-    </dgm:linClrLst>
-    <dgm:effectClrLst/>
-    <dgm:txLinClrLst/>
-    <dgm:txFillClrLst/>
-    <dgm:txEffectClrLst/>
-  </dgm:styleLbl>
-  <dgm:styleLbl name="asst3">
-    <dgm:fillClrLst>
-      <a:schemeClr val="accent4"/>
-    </dgm:fillClrLst>
-    <dgm:linClrLst meth="repeat">
-      <a:schemeClr val="lt1"/>
-    </dgm:linClrLst>
-    <dgm:effectClrLst/>
-    <dgm:txLinClrLst/>
-    <dgm:txFillClrLst/>
-    <dgm:txEffectClrLst/>
-  </dgm:styleLbl>
-  <dgm:styleLbl name="asst4">
-    <dgm:fillClrLst>
-      <a:schemeClr val="accent5"/>
-    </dgm:fillClrLst>
-    <dgm:linClrLst meth="repeat">
-      <a:schemeClr val="lt1"/>
-    </dgm:linClrLst>
-    <dgm:effectClrLst/>
-    <dgm:txLinClrLst/>
-    <dgm:txFillClrLst/>
-    <dgm:txEffectClrLst/>
-  </dgm:styleLbl>
-  <dgm:styleLbl name="parChTrans2D1">
-    <dgm:fillClrLst meth="repeat">
-      <a:schemeClr val="accent2"/>
-    </dgm:fillClrLst>
-    <dgm:linClrLst meth="repeat">
-      <a:schemeClr val="lt1"/>
-    </dgm:linClrLst>
-    <dgm:effectClrLst/>
-    <dgm:txLinClrLst/>
-    <dgm:txFillClrLst meth="repeat">
-      <a:schemeClr val="lt1"/>
-    </dgm:txFillClrLst>
-    <dgm:txEffectClrLst/>
-  </dgm:styleLbl>
-  <dgm:styleLbl name="parChTrans2D2">
-    <dgm:fillClrLst meth="repeat">
-      <a:schemeClr val="accent3"/>
-    </dgm:fillClrLst>
-    <dgm:linClrLst meth="repeat">
-      <a:schemeClr val="lt1"/>
-    </dgm:linClrLst>
-    <dgm:effectClrLst/>
-    <dgm:txLinClrLst/>
-    <dgm:txFillClrLst/>
-    <dgm:txEffectClrLst/>
-  </dgm:styleLbl>
-  <dgm:styleLbl name="parChTrans2D3">
-    <dgm:fillClrLst meth="repeat">
-      <a:schemeClr val="accent4"/>
-    </dgm:fillClrLst>
-    <dgm:linClrLst meth="repeat">
-      <a:schemeClr val="lt1"/>
-    </dgm:linClrLst>
-    <dgm:effectClrLst/>
-    <dgm:txLinClrLst/>
-    <dgm:txFillClrLst/>
-    <dgm:txEffectClrLst/>
-  </dgm:styleLbl>
-  <dgm:styleLbl name="parChTrans2D4">
-    <dgm:fillClrLst meth="repeat">
-      <a:schemeClr val="accent5"/>
-    </dgm:fillClrLst>
-    <dgm:linClrLst meth="repeat">
-      <a:schemeClr val="lt1"/>
-    </dgm:linClrLst>
-    <dgm:effectClrLst/>
-    <dgm:txLinClrLst/>
-    <dgm:txFillClrLst meth="repeat">
-      <a:schemeClr val="lt1"/>
-    </dgm:txFillClrLst>
-    <dgm:txEffectClrLst/>
-  </dgm:styleLbl>
-  <dgm:styleLbl name="parChTrans1D1">
-    <dgm:fillClrLst meth="repeat">
-      <a:schemeClr val="accent2"/>
-    </dgm:fillClrLst>
-    <dgm:linClrLst meth="repeat">
-      <a:schemeClr val="accent1"/>
-    </dgm:linClrLst>
-    <dgm:effectClrLst/>
-    <dgm:txLinClrLst/>
-    <dgm:txFillClrLst meth="repeat">
-      <a:schemeClr val="tx1"/>
-    </dgm:txFillClrLst>
-    <dgm:txEffectClrLst/>
-  </dgm:styleLbl>
-  <dgm:styleLbl name="parChTrans1D2">
-    <dgm:fillClrLst meth="repeat">
-      <a:schemeClr val="accent3">
-        <a:tint val="90000"/>
-      </a:schemeClr>
-    </dgm:fillClrLst>
-    <dgm:linClrLst meth="repeat">
-      <a:schemeClr val="accent2"/>
-    </dgm:linClrLst>
-    <dgm:effectClrLst/>
-    <dgm:txLinClrLst/>
-    <dgm:txFillClrLst meth="repeat">
-      <a:schemeClr val="tx1"/>
-    </dgm:txFillClrLst>
-    <dgm:txEffectClrLst/>
-  </dgm:styleLbl>
-  <dgm:styleLbl name="parChTrans1D3">
-    <dgm:fillClrLst meth="repeat">
-      <a:schemeClr val="accent4">
-        <a:tint val="70000"/>
-      </a:schemeClr>
-    </dgm:fillClrLst>
-    <dgm:linClrLst meth="repeat">
-      <a:schemeClr val="accent3"/>
-    </dgm:linClrLst>
-    <dgm:effectClrLst/>
-    <dgm:txLinClrLst/>
-    <dgm:txFillClrLst meth="repeat">
-      <a:schemeClr val="tx1"/>
-    </dgm:txFillClrLst>
-    <dgm:txEffectClrLst/>
-  </dgm:styleLbl>
-  <dgm:styleLbl name="parChTrans1D4">
-    <dgm:fillClrLst meth="repeat">
-      <a:schemeClr val="accent5">
-        <a:tint val="50000"/>
-      </a:schemeClr>
-    </dgm:fillClrLst>
-    <dgm:linClrLst meth="repeat">
-      <a:schemeClr val="accent4"/>
-    </dgm:linClrLst>
-    <dgm:effectClrLst/>
-    <dgm:txLinClrLst/>
-    <dgm:txFillClrLst meth="repeat">
-      <a:schemeClr val="tx1"/>
-    </dgm:txFillClrLst>
-    <dgm:txEffectClrLst/>
-  </dgm:styleLbl>
-  <dgm:styleLbl name="fgAcc1">
-    <dgm:fillClrLst meth="repeat">
-      <a:schemeClr val="lt1">
-        <a:alpha val="90000"/>
-      </a:schemeClr>
-    </dgm:fillClrLst>
-    <dgm:linClrLst meth="repeat">
-      <a:schemeClr val="accent2"/>
-      <a:schemeClr val="accent3"/>
-      <a:schemeClr val="accent4"/>
-      <a:schemeClr val="accent5"/>
-      <a:schemeClr val="accent6"/>
-    </dgm:linClrLst>
-    <dgm:effectClrLst/>
-    <dgm:txLinClrLst/>
-    <dgm:txFillClrLst meth="repeat">
-      <a:schemeClr val="dk1"/>
-    </dgm:txFillClrLst>
-    <dgm:txEffectClrLst/>
-  </dgm:styleLbl>
-  <dgm:styleLbl name="conFgAcc1">
-    <dgm:fillClrLst meth="repeat">
-      <a:schemeClr val="lt1">
-        <a:alpha val="90000"/>
-      </a:schemeClr>
-    </dgm:fillClrLst>
-    <dgm:linClrLst meth="repeat">
-      <a:schemeClr val="accent2"/>
-      <a:schemeClr val="accent3"/>
-      <a:schemeClr val="accent4"/>
-      <a:schemeClr val="accent5"/>
-      <a:schemeClr val="accent6"/>
-    </dgm:linClrLst>
-    <dgm:effectClrLst/>
-    <dgm:txLinClrLst/>
-    <dgm:txFillClrLst meth="repeat">
-      <a:schemeClr val="dk1"/>
-    </dgm:txFillClrLst>
-    <dgm:txEffectClrLst/>
-  </dgm:styleLbl>
-  <dgm:styleLbl name="alignAcc1">
-    <dgm:fillClrLst meth="repeat">
-      <a:schemeClr val="lt1">
-        <a:alpha val="90000"/>
-      </a:schemeClr>
-    </dgm:fillClrLst>
-    <dgm:linClrLst meth="repeat">
-      <a:schemeClr val="accent2"/>
-      <a:schemeClr val="accent3"/>
-      <a:schemeClr val="accent4"/>
-      <a:schemeClr val="accent5"/>
-      <a:schemeClr val="accent6"/>
-    </dgm:linClrLst>
-    <dgm:effectClrLst/>
-    <dgm:txLinClrLst/>
-    <dgm:txFillClrLst meth="repeat">
-      <a:schemeClr val="dk1"/>
-    </dgm:txFillClrLst>
-    <dgm:txEffectClrLst/>
-  </dgm:styleLbl>
-  <dgm:styleLbl name="trAlignAcc1">
-    <dgm:fillClrLst meth="repeat">
-      <a:schemeClr val="lt1">
-        <a:alpha val="40000"/>
-      </a:schemeClr>
-    </dgm:fillClrLst>
-    <dgm:linClrLst meth="repeat">
-      <a:schemeClr val="accent1"/>
-    </dgm:linClrLst>
-    <dgm:effectClrLst/>
-    <dgm:txLinClrLst/>
-    <dgm:txFillClrLst meth="repeat">
-      <a:schemeClr val="dk1"/>
-    </dgm:txFillClrLst>
-    <dgm:txEffectClrLst/>
-  </dgm:styleLbl>
-  <dgm:styleLbl name="bgAcc1">
-    <dgm:fillClrLst meth="repeat">
-      <a:schemeClr val="lt1">
-        <a:alpha val="90000"/>
-      </a:schemeClr>
-    </dgm:fillClrLst>
-    <dgm:linClrLst meth="repeat">
-      <a:schemeClr val="accent2"/>
-      <a:schemeClr val="accent3"/>
-      <a:schemeClr val="accent4"/>
-      <a:schemeClr val="accent5"/>
-      <a:schemeClr val="accent6"/>
-    </dgm:linClrLst>
-    <dgm:effectClrLst/>
-    <dgm:txLinClrLst/>
-    <dgm:txFillClrLst meth="repeat">
-      <a:schemeClr val="dk1"/>
-    </dgm:txFillClrLst>
-    <dgm:txEffectClrLst/>
-  </dgm:styleLbl>
-  <dgm:styleLbl name="solidFgAcc1">
-    <dgm:fillClrLst meth="repeat">
-      <a:schemeClr val="lt1"/>
-    </dgm:fillClrLst>
-    <dgm:linClrLst meth="repeat">
-      <a:schemeClr val="accent2"/>
-      <a:schemeClr val="accent3"/>
-      <a:schemeClr val="accent4"/>
-      <a:schemeClr val="accent5"/>
-      <a:schemeClr val="accent6"/>
-    </dgm:linClrLst>
-    <dgm:effectClrLst/>
-    <dgm:txLinClrLst/>
-    <dgm:txFillClrLst meth="repeat">
-      <a:schemeClr val="dk1"/>
-    </dgm:txFillClrLst>
-    <dgm:txEffectClrLst/>
-  </dgm:styleLbl>
-  <dgm:styleLbl name="solidAlignAcc1">
-    <dgm:fillClrLst meth="repeat">
-      <a:schemeClr val="lt1"/>
-    </dgm:fillClrLst>
-    <dgm:linClrLst meth="repeat">
-      <a:schemeClr val="accent2"/>
-      <a:schemeClr val="accent3"/>
-      <a:schemeClr val="accent4"/>
-      <a:schemeClr val="accent5"/>
-      <a:schemeClr val="accent6"/>
-    </dgm:linClrLst>
-    <dgm:effectClrLst/>
-    <dgm:txLinClrLst/>
-    <dgm:txFillClrLst meth="repeat">
-      <a:schemeClr val="dk1"/>
-    </dgm:txFillClrLst>
-    <dgm:txEffectClrLst/>
-  </dgm:styleLbl>
-  <dgm:styleLbl name="solidBgAcc1">
-    <dgm:fillClrLst meth="repeat">
-      <a:schemeClr val="lt1"/>
-    </dgm:fillClrLst>
-    <dgm:linClrLst meth="repeat">
-      <a:schemeClr val="accent2"/>
-      <a:schemeClr val="accent3"/>
-      <a:schemeClr val="accent4"/>
-      <a:schemeClr val="accent5"/>
-      <a:schemeClr val="accent6"/>
-    </dgm:linClrLst>
-    <dgm:effectClrLst/>
-    <dgm:txLinClrLst/>
-    <dgm:txFillClrLst meth="repeat">
-      <a:schemeClr val="dk1"/>
-    </dgm:txFillClrLst>
-    <dgm:txEffectClrLst/>
-  </dgm:styleLbl>
-  <dgm:styleLbl name="fgAccFollowNode1">
-    <dgm:fillClrLst meth="repeat">
-      <a:schemeClr val="accent2">
-        <a:tint val="40000"/>
-        <a:alpha val="90000"/>
-      </a:schemeClr>
-      <a:schemeClr val="accent3">
-        <a:tint val="40000"/>
-        <a:alpha val="90000"/>
-      </a:schemeClr>
-      <a:schemeClr val="accent4">
-        <a:tint val="40000"/>
-        <a:alpha val="90000"/>
-      </a:schemeClr>
-      <a:schemeClr val="accent5">
-        <a:tint val="40000"/>
-        <a:alpha val="90000"/>
-      </a:schemeClr>
-      <a:schemeClr val="accent6">
-        <a:tint val="40000"/>
-        <a:alpha val="90000"/>
-      </a:schemeClr>
-    </dgm:fillClrLst>
-    <dgm:linClrLst meth="repeat">
-      <a:schemeClr val="accent2">
-        <a:tint val="40000"/>
-        <a:alpha val="90000"/>
-      </a:schemeClr>
-      <a:schemeClr val="accent3">
-        <a:tint val="40000"/>
-        <a:alpha val="90000"/>
-      </a:schemeClr>
-      <a:schemeClr val="accent4">
-        <a:tint val="40000"/>
-        <a:alpha val="90000"/>
-      </a:schemeClr>
-      <a:schemeClr val="accent5">
-        <a:tint val="40000"/>
-        <a:alpha val="90000"/>
-      </a:schemeClr>
-      <a:schemeClr val="accent6">
-        <a:tint val="40000"/>
-        <a:alpha val="90000"/>
-      </a:schemeClr>
-    </dgm:linClrLst>
-    <dgm:effectClrLst/>
-    <dgm:txLinClrLst/>
-    <dgm:txFillClrLst meth="repeat">
-      <a:schemeClr val="dk1"/>
-    </dgm:txFillClrLst>
-    <dgm:txEffectClrLst/>
-  </dgm:styleLbl>
-  <dgm:styleLbl name="alignAccFollowNode1">
-    <dgm:fillClrLst meth="repeat">
-      <a:schemeClr val="accent2">
-        <a:tint val="40000"/>
-        <a:alpha val="90000"/>
-      </a:schemeClr>
-      <a:schemeClr val="accent3">
-        <a:tint val="40000"/>
-        <a:alpha val="90000"/>
-      </a:schemeClr>
-      <a:schemeClr val="accent4">
-        <a:tint val="40000"/>
-        <a:alpha val="90000"/>
-      </a:schemeClr>
-      <a:schemeClr val="accent5">
-        <a:tint val="40000"/>
-        <a:alpha val="90000"/>
-      </a:schemeClr>
-      <a:schemeClr val="accent6">
-        <a:tint val="40000"/>
-        <a:alpha val="90000"/>
-      </a:schemeClr>
-    </dgm:fillClrLst>
-    <dgm:linClrLst meth="repeat">
-      <a:schemeClr val="accent2">
-        <a:tint val="40000"/>
-        <a:alpha val="90000"/>
-      </a:schemeClr>
-      <a:schemeClr val="accent3">
-        <a:tint val="40000"/>
-        <a:alpha val="90000"/>
-      </a:schemeClr>
-      <a:schemeClr val="accent4">
-        <a:tint val="40000"/>
-        <a:alpha val="90000"/>
-      </a:schemeClr>
-      <a:schemeClr val="accent5">
-        <a:tint val="40000"/>
-        <a:alpha val="90000"/>
-      </a:schemeClr>
-      <a:schemeClr val="accent6">
-        <a:tint val="40000"/>
-        <a:alpha val="90000"/>
-      </a:schemeClr>
-    </dgm:linClrLst>
-    <dgm:effectClrLst/>
-    <dgm:txLinClrLst/>
-    <dgm:txFillClrLst meth="repeat">
-      <a:schemeClr val="dk1"/>
-    </dgm:txFillClrLst>
-    <dgm:txEffectClrLst/>
-  </dgm:styleLbl>
-  <dgm:styleLbl name="bgAccFollowNode1">
-    <dgm:fillClrLst meth="repeat">
-      <a:schemeClr val="accent2">
-        <a:tint val="40000"/>
-        <a:alpha val="90000"/>
-      </a:schemeClr>
-      <a:schemeClr val="accent3">
-        <a:tint val="40000"/>
-        <a:alpha val="90000"/>
-      </a:schemeClr>
-      <a:schemeClr val="accent4">
-        <a:tint val="40000"/>
-        <a:alpha val="90000"/>
-      </a:schemeClr>
-      <a:schemeClr val="accent5">
-        <a:tint val="40000"/>
-        <a:alpha val="90000"/>
-      </a:schemeClr>
-      <a:schemeClr val="accent6">
-        <a:tint val="40000"/>
-        <a:alpha val="90000"/>
-      </a:schemeClr>
-    </dgm:fillClrLst>
-    <dgm:linClrLst meth="repeat">
-      <a:schemeClr val="accent2">
-        <a:tint val="40000"/>
-        <a:alpha val="90000"/>
-      </a:schemeClr>
-      <a:schemeClr val="accent3">
-        <a:tint val="40000"/>
-        <a:alpha val="90000"/>
-      </a:schemeClr>
-      <a:schemeClr val="accent4">
-        <a:tint val="40000"/>
-        <a:alpha val="90000"/>
-      </a:schemeClr>
-      <a:schemeClr val="accent5">
-        <a:tint val="40000"/>
-        <a:alpha val="90000"/>
-      </a:schemeClr>
-      <a:schemeClr val="accent6">
-        <a:tint val="40000"/>
-        <a:alpha val="90000"/>
-      </a:schemeClr>
-    </dgm:linClrLst>
-    <dgm:effectClrLst/>
-    <dgm:txLinClrLst/>
-    <dgm:txFillClrLst meth="repeat">
-      <a:schemeClr val="dk1"/>
-    </dgm:txFillClrLst>
-    <dgm:txEffectClrLst/>
-  </dgm:styleLbl>
-  <dgm:styleLbl name="fgAcc0">
-    <dgm:fillClrLst meth="repeat">
-      <a:schemeClr val="lt1">
-        <a:alpha val="90000"/>
-      </a:schemeClr>
-    </dgm:fillClrLst>
-    <dgm:linClrLst>
-      <a:schemeClr val="accent1"/>
-    </dgm:linClrLst>
-    <dgm:effectClrLst/>
-    <dgm:txLinClrLst/>
-    <dgm:txFillClrLst meth="repeat">
-      <a:schemeClr val="dk1"/>
-    </dgm:txFillClrLst>
-    <dgm:txEffectClrLst/>
-  </dgm:styleLbl>
-  <dgm:styleLbl name="fgAcc2">
-    <dgm:fillClrLst meth="repeat">
-      <a:schemeClr val="lt1">
-        <a:alpha val="90000"/>
-      </a:schemeClr>
-    </dgm:fillClrLst>
-    <dgm:linClrLst>
-      <a:schemeClr val="accent2"/>
-    </dgm:linClrLst>
-    <dgm:effectClrLst/>
-    <dgm:txLinClrLst/>
-    <dgm:txFillClrLst meth="repeat">
-      <a:schemeClr val="dk1"/>
-    </dgm:txFillClrLst>
-    <dgm:txEffectClrLst/>
-  </dgm:styleLbl>
-  <dgm:styleLbl name="fgAcc3">
-    <dgm:fillClrLst meth="repeat">
-      <a:schemeClr val="lt1">
-        <a:alpha val="90000"/>
-      </a:schemeClr>
-    </dgm:fillClrLst>
-    <dgm:linClrLst>
-      <a:schemeClr val="accent3"/>
-    </dgm:linClrLst>
-    <dgm:effectClrLst/>
-    <dgm:txLinClrLst/>
-    <dgm:txFillClrLst meth="repeat">
-      <a:schemeClr val="dk1"/>
-    </dgm:txFillClrLst>
-    <dgm:txEffectClrLst/>
-  </dgm:styleLbl>
-  <dgm:styleLbl name="fgAcc4">
-    <dgm:fillClrLst meth="repeat">
-      <a:schemeClr val="lt1">
-        <a:alpha val="90000"/>
-      </a:schemeClr>
-    </dgm:fillClrLst>
-    <dgm:linClrLst>
-      <a:schemeClr val="accent4"/>
-    </dgm:linClrLst>
-    <dgm:effectClrLst/>
-    <dgm:txLinClrLst/>
-    <dgm:txFillClrLst meth="repeat">
-      <a:schemeClr val="dk1"/>
-    </dgm:txFillClrLst>
-    <dgm:txEffectClrLst/>
-  </dgm:styleLbl>
-  <dgm:styleLbl name="bgShp">
-    <dgm:fillClrLst meth="repeat">
-      <a:schemeClr val="bg1">
-        <a:lumMod val="95000"/>
-      </a:schemeClr>
-    </dgm:fillClrLst>
-    <dgm:linClrLst meth="repeat">
-      <a:schemeClr val="dk1"/>
-    </dgm:linClrLst>
-    <dgm:effectClrLst/>
-    <dgm:txLinClrLst/>
-    <dgm:txFillClrLst meth="repeat">
-      <a:schemeClr val="dk1"/>
-    </dgm:txFillClrLst>
-    <dgm:txEffectClrLst/>
-  </dgm:styleLbl>
-  <dgm:styleLbl name="dkBgShp">
-    <dgm:fillClrLst meth="repeat">
-      <a:schemeClr val="accent2">
-        <a:shade val="90000"/>
-      </a:schemeClr>
-    </dgm:fillClrLst>
-    <dgm:linClrLst meth="repeat">
-      <a:schemeClr val="dk1"/>
-    </dgm:linClrLst>
-    <dgm:effectClrLst/>
-    <dgm:txLinClrLst/>
-    <dgm:txFillClrLst meth="repeat">
-      <a:schemeClr val="lt1"/>
-    </dgm:txFillClrLst>
-    <dgm:txEffectClrLst/>
-  </dgm:styleLbl>
-  <dgm:styleLbl name="trBgShp">
-    <dgm:fillClrLst meth="repeat">
-      <a:schemeClr val="accent1">
-        <a:tint val="50000"/>
-        <a:alpha val="40000"/>
-      </a:schemeClr>
-    </dgm:fillClrLst>
-    <dgm:linClrLst meth="repeat">
-      <a:schemeClr val="accent2"/>
-    </dgm:linClrLst>
-    <dgm:effectClrLst/>
-    <dgm:txLinClrLst/>
-    <dgm:txFillClrLst meth="repeat">
-      <a:schemeClr val="lt1"/>
-    </dgm:txFillClrLst>
-    <dgm:txEffectClrLst/>
-  </dgm:styleLbl>
-  <dgm:styleLbl name="fgShp">
-    <dgm:fillClrLst meth="repeat">
-      <a:schemeClr val="accent2">
-        <a:tint val="40000"/>
-      </a:schemeClr>
-    </dgm:fillClrLst>
-    <dgm:linClrLst meth="repeat">
-      <a:schemeClr val="lt1"/>
-    </dgm:linClrLst>
-    <dgm:effectClrLst/>
-    <dgm:txLinClrLst/>
-    <dgm:txFillClrLst meth="repeat">
-      <a:schemeClr val="dk1"/>
-    </dgm:txFillClrLst>
-    <dgm:txEffectClrLst/>
-  </dgm:styleLbl>
-  <dgm:styleLbl name="revTx">
-    <dgm:fillClrLst meth="repeat">
-      <a:schemeClr val="lt1">
-        <a:alpha val="0"/>
-      </a:schemeClr>
-    </dgm:fillClrLst>
-    <dgm:linClrLst meth="repeat">
-      <a:schemeClr val="dk1">
-        <a:alpha val="0"/>
-      </a:schemeClr>
-    </dgm:linClrLst>
-    <dgm:effectClrLst/>
-    <dgm:txLinClrLst/>
-    <dgm:txFillClrLst meth="repeat">
-      <a:schemeClr val="tx1"/>
-    </dgm:txFillClrLst>
-    <dgm:txEffectClrLst/>
-  </dgm:styleLbl>
-</dgm:colorsDef>
-</file>
-
-<file path=ppt/diagrams/data1.xml><?xml version="1.0" encoding="utf-8"?>
-<dgm:dataModel xmlns:dgm="http://schemas.openxmlformats.org/drawingml/2006/diagram" xmlns:a="http://schemas.openxmlformats.org/drawingml/2006/main">
-  <dgm:ptLst>
-    <dgm:pt modelId="{F8C1B19B-CCFF-4DA1-837A-A5335431493E}" type="doc">
-      <dgm:prSet loTypeId="urn:microsoft.com/office/officeart/2018/2/layout/IconVerticalSolidList" loCatId="icon" qsTypeId="urn:microsoft.com/office/officeart/2005/8/quickstyle/simple1" qsCatId="simple" csTypeId="urn:microsoft.com/office/officeart/2018/5/colors/Iconchunking_neutralbg_colorful1" csCatId="colorful" phldr="1"/>
-      <dgm:spPr/>
-      <dgm:t>
-        <a:bodyPr/>
-        <a:lstStyle/>
-        <a:p>
-          <a:endParaRPr lang="en-US"/>
-        </a:p>
-      </dgm:t>
-    </dgm:pt>
-    <dgm:pt modelId="{AB236E87-7C08-45F6-83D2-28399A468689}">
-      <dgm:prSet/>
-      <dgm:spPr/>
-      <dgm:t>
-        <a:bodyPr/>
-        <a:lstStyle/>
-        <a:p>
-          <a:r>
-            <a:rPr lang="en-US"/>
-            <a:t>Malware is downloaded accidently</a:t>
-          </a:r>
-        </a:p>
-      </dgm:t>
-    </dgm:pt>
-    <dgm:pt modelId="{5B9ED76D-82C3-4B5A-A82B-0195C90BD595}" type="parTrans" cxnId="{CFB392ED-F237-413D-80C5-2A30961B0728}">
-      <dgm:prSet/>
-      <dgm:spPr/>
-      <dgm:t>
-        <a:bodyPr/>
-        <a:lstStyle/>
-        <a:p>
-          <a:endParaRPr lang="en-US"/>
-        </a:p>
-      </dgm:t>
-    </dgm:pt>
-    <dgm:pt modelId="{41A546E7-F3DC-453B-B3D3-2822E3411F1B}" type="sibTrans" cxnId="{CFB392ED-F237-413D-80C5-2A30961B0728}">
-      <dgm:prSet/>
-      <dgm:spPr/>
-      <dgm:t>
-        <a:bodyPr/>
-        <a:lstStyle/>
-        <a:p>
-          <a:endParaRPr lang="en-US"/>
-        </a:p>
-      </dgm:t>
-    </dgm:pt>
-    <dgm:pt modelId="{F5C4C477-8C76-496C-A037-4AF7305E2776}">
-      <dgm:prSet/>
-      <dgm:spPr/>
-      <dgm:t>
-        <a:bodyPr/>
-        <a:lstStyle/>
-        <a:p>
-          <a:r>
-            <a:rPr lang="en-US"/>
-            <a:t>Theft caused by malware can cost money and computers' capabilities</a:t>
-          </a:r>
-        </a:p>
-      </dgm:t>
-    </dgm:pt>
-    <dgm:pt modelId="{1CEBCB1D-DB11-4829-A696-6A1B7CDC66DE}" type="parTrans" cxnId="{14BA60D5-BA69-40AF-8E60-392DDD7F24DC}">
-      <dgm:prSet/>
-      <dgm:spPr/>
-      <dgm:t>
-        <a:bodyPr/>
-        <a:lstStyle/>
-        <a:p>
-          <a:endParaRPr lang="en-US"/>
-        </a:p>
-      </dgm:t>
-    </dgm:pt>
-    <dgm:pt modelId="{89706E8D-2AB8-43A3-A94A-5E84F0DFA4F6}" type="sibTrans" cxnId="{14BA60D5-BA69-40AF-8E60-392DDD7F24DC}">
-      <dgm:prSet/>
-      <dgm:spPr/>
-      <dgm:t>
-        <a:bodyPr/>
-        <a:lstStyle/>
-        <a:p>
-          <a:endParaRPr lang="en-US"/>
-        </a:p>
-      </dgm:t>
-    </dgm:pt>
-    <dgm:pt modelId="{B05FC9FC-4D42-4FD7-82CC-2327FB5627FC}">
-      <dgm:prSet/>
-      <dgm:spPr/>
-      <dgm:t>
-        <a:bodyPr/>
-        <a:lstStyle/>
-        <a:p>
-          <a:r>
-            <a:rPr lang="en-US"/>
-            <a:t>Malware can look just like good-ware, but it is misleading</a:t>
-          </a:r>
-        </a:p>
-      </dgm:t>
-    </dgm:pt>
-    <dgm:pt modelId="{76F64A43-390D-4E4D-B100-395E159E4E5C}" type="parTrans" cxnId="{19467884-16E4-4128-A4EC-6A1EDDE598A9}">
-      <dgm:prSet/>
-      <dgm:spPr/>
-      <dgm:t>
-        <a:bodyPr/>
-        <a:lstStyle/>
-        <a:p>
-          <a:endParaRPr lang="en-US"/>
-        </a:p>
-      </dgm:t>
-    </dgm:pt>
-    <dgm:pt modelId="{12E2E7CA-C44B-4475-9910-B987DF7BF875}" type="sibTrans" cxnId="{19467884-16E4-4128-A4EC-6A1EDDE598A9}">
-      <dgm:prSet/>
-      <dgm:spPr/>
-      <dgm:t>
-        <a:bodyPr/>
-        <a:lstStyle/>
-        <a:p>
-          <a:endParaRPr lang="en-US"/>
-        </a:p>
-      </dgm:t>
-    </dgm:pt>
-    <dgm:pt modelId="{8084384F-827D-41D8-8AAC-5A48AAEE1A24}" type="pres">
-      <dgm:prSet presAssocID="{F8C1B19B-CCFF-4DA1-837A-A5335431493E}" presName="root" presStyleCnt="0">
-        <dgm:presLayoutVars>
-          <dgm:dir/>
-          <dgm:resizeHandles val="exact"/>
-        </dgm:presLayoutVars>
-      </dgm:prSet>
-      <dgm:spPr/>
-    </dgm:pt>
-    <dgm:pt modelId="{9ADF288C-4BFF-4A78-9B2E-72754A842ABC}" type="pres">
-      <dgm:prSet presAssocID="{AB236E87-7C08-45F6-83D2-28399A468689}" presName="compNode" presStyleCnt="0"/>
-      <dgm:spPr/>
-    </dgm:pt>
-    <dgm:pt modelId="{09D29445-C1A2-45FE-86ED-331FF6209ECE}" type="pres">
-      <dgm:prSet presAssocID="{AB236E87-7C08-45F6-83D2-28399A468689}" presName="bgRect" presStyleLbl="bgShp" presStyleIdx="0" presStyleCnt="3"/>
-      <dgm:spPr/>
-    </dgm:pt>
-    <dgm:pt modelId="{DE4FF362-D79E-4DC3-A8A1-33C12F43CBC1}" type="pres">
-      <dgm:prSet presAssocID="{AB236E87-7C08-45F6-83D2-28399A468689}" presName="iconRect" presStyleLbl="node1" presStyleIdx="0" presStyleCnt="3"/>
-      <dgm:spPr>
-        <a:blipFill>
-          <a:blip xmlns:r="http://schemas.openxmlformats.org/officeDocument/2006/relationships" r:embed="rId1">
-            <a:extLst>
-              <a:ext uri="{28A0092B-C50C-407E-A947-70E740481C1C}">
-                <a14:useLocalDpi xmlns:a14="http://schemas.microsoft.com/office/drawing/2010/main" val="0"/>
-              </a:ext>
-              <a:ext uri="{96DAC541-7B7A-43D3-8B79-37D633B846F1}">
-                <asvg:svgBlip xmlns:asvg="http://schemas.microsoft.com/office/drawing/2016/SVG/main" r:embed="rId2"/>
-              </a:ext>
-            </a:extLst>
-          </a:blip>
-          <a:stretch>
-            <a:fillRect/>
-          </a:stretch>
-        </a:blipFill>
-        <a:ln>
-          <a:noFill/>
-        </a:ln>
-      </dgm:spPr>
-      <dgm:extLst>
-        <a:ext uri="{E40237B7-FDA0-4F09-8148-C483321AD2D9}">
-          <dgm14:cNvPr xmlns:dgm14="http://schemas.microsoft.com/office/drawing/2010/diagram" id="0" name="" descr="Computer"/>
-        </a:ext>
-      </dgm:extLst>
-    </dgm:pt>
-    <dgm:pt modelId="{865E1BE7-9380-4D2C-AF39-C5300FD25B7B}" type="pres">
-      <dgm:prSet presAssocID="{AB236E87-7C08-45F6-83D2-28399A468689}" presName="spaceRect" presStyleCnt="0"/>
-      <dgm:spPr/>
-    </dgm:pt>
-    <dgm:pt modelId="{548E80D3-43E4-42A7-BBD0-D150DA1F878F}" type="pres">
-      <dgm:prSet presAssocID="{AB236E87-7C08-45F6-83D2-28399A468689}" presName="parTx" presStyleLbl="revTx" presStyleIdx="0" presStyleCnt="3">
-        <dgm:presLayoutVars>
-          <dgm:chMax val="0"/>
-          <dgm:chPref val="0"/>
-        </dgm:presLayoutVars>
-      </dgm:prSet>
-      <dgm:spPr/>
-    </dgm:pt>
-    <dgm:pt modelId="{00EC7A83-736D-4C8D-8905-BB6D606E0684}" type="pres">
-      <dgm:prSet presAssocID="{41A546E7-F3DC-453B-B3D3-2822E3411F1B}" presName="sibTrans" presStyleCnt="0"/>
-      <dgm:spPr/>
-    </dgm:pt>
-    <dgm:pt modelId="{EB66F22A-854A-46E2-8846-F3D83A57FC7C}" type="pres">
-      <dgm:prSet presAssocID="{F5C4C477-8C76-496C-A037-4AF7305E2776}" presName="compNode" presStyleCnt="0"/>
-      <dgm:spPr/>
-    </dgm:pt>
-    <dgm:pt modelId="{62ACD6F9-A0DD-4D23-80FD-88EECDFD3006}" type="pres">
-      <dgm:prSet presAssocID="{F5C4C477-8C76-496C-A037-4AF7305E2776}" presName="bgRect" presStyleLbl="bgShp" presStyleIdx="1" presStyleCnt="3"/>
-      <dgm:spPr/>
-    </dgm:pt>
-    <dgm:pt modelId="{B4DAAE97-0404-448C-801E-86FF86E92B6A}" type="pres">
-      <dgm:prSet presAssocID="{F5C4C477-8C76-496C-A037-4AF7305E2776}" presName="iconRect" presStyleLbl="node1" presStyleIdx="1" presStyleCnt="3"/>
-      <dgm:spPr>
-        <a:blipFill>
-          <a:blip xmlns:r="http://schemas.openxmlformats.org/officeDocument/2006/relationships" r:embed="rId3">
-            <a:extLst>
-              <a:ext uri="{28A0092B-C50C-407E-A947-70E740481C1C}">
-                <a14:useLocalDpi xmlns:a14="http://schemas.microsoft.com/office/drawing/2010/main" val="0"/>
-              </a:ext>
-              <a:ext uri="{96DAC541-7B7A-43D3-8B79-37D633B846F1}">
-                <asvg:svgBlip xmlns:asvg="http://schemas.microsoft.com/office/drawing/2016/SVG/main" r:embed="rId4"/>
-              </a:ext>
-            </a:extLst>
-          </a:blip>
-          <a:stretch>
-            <a:fillRect/>
-          </a:stretch>
-        </a:blipFill>
-        <a:ln>
-          <a:noFill/>
-        </a:ln>
-      </dgm:spPr>
-      <dgm:extLst>
-        <a:ext uri="{E40237B7-FDA0-4F09-8148-C483321AD2D9}">
-          <dgm14:cNvPr xmlns:dgm14="http://schemas.microsoft.com/office/drawing/2010/diagram" id="0" name="" descr="Robber"/>
-        </a:ext>
-      </dgm:extLst>
-    </dgm:pt>
-    <dgm:pt modelId="{2156950D-F246-43A8-971B-6F8189EA8995}" type="pres">
-      <dgm:prSet presAssocID="{F5C4C477-8C76-496C-A037-4AF7305E2776}" presName="spaceRect" presStyleCnt="0"/>
-      <dgm:spPr/>
-    </dgm:pt>
-    <dgm:pt modelId="{F867A84C-16F0-4374-A16E-7B45A70E2ECC}" type="pres">
-      <dgm:prSet presAssocID="{F5C4C477-8C76-496C-A037-4AF7305E2776}" presName="parTx" presStyleLbl="revTx" presStyleIdx="1" presStyleCnt="3">
-        <dgm:presLayoutVars>
-          <dgm:chMax val="0"/>
-          <dgm:chPref val="0"/>
-        </dgm:presLayoutVars>
-      </dgm:prSet>
-      <dgm:spPr/>
-    </dgm:pt>
-    <dgm:pt modelId="{11DFCDE5-1906-4296-941F-6FEFB42FC4EA}" type="pres">
-      <dgm:prSet presAssocID="{89706E8D-2AB8-43A3-A94A-5E84F0DFA4F6}" presName="sibTrans" presStyleCnt="0"/>
-      <dgm:spPr/>
-    </dgm:pt>
-    <dgm:pt modelId="{4D028F42-2A3B-43B6-9F68-71E3BA279804}" type="pres">
-      <dgm:prSet presAssocID="{B05FC9FC-4D42-4FD7-82CC-2327FB5627FC}" presName="compNode" presStyleCnt="0"/>
-      <dgm:spPr/>
-    </dgm:pt>
-    <dgm:pt modelId="{F70CD3A0-8348-4EDC-978B-99BBB1A42A9A}" type="pres">
-      <dgm:prSet presAssocID="{B05FC9FC-4D42-4FD7-82CC-2327FB5627FC}" presName="bgRect" presStyleLbl="bgShp" presStyleIdx="2" presStyleCnt="3"/>
-      <dgm:spPr/>
-    </dgm:pt>
-    <dgm:pt modelId="{3277A205-9A39-40AB-B0CD-7457E5AE1562}" type="pres">
-      <dgm:prSet presAssocID="{B05FC9FC-4D42-4FD7-82CC-2327FB5627FC}" presName="iconRect" presStyleLbl="node1" presStyleIdx="2" presStyleCnt="3"/>
-      <dgm:spPr>
-        <a:blipFill>
-          <a:blip xmlns:r="http://schemas.openxmlformats.org/officeDocument/2006/relationships" r:embed="rId5">
-            <a:extLst>
-              <a:ext uri="{28A0092B-C50C-407E-A947-70E740481C1C}">
-                <a14:useLocalDpi xmlns:a14="http://schemas.microsoft.com/office/drawing/2010/main" val="0"/>
-              </a:ext>
-              <a:ext uri="{96DAC541-7B7A-43D3-8B79-37D633B846F1}">
-                <asvg:svgBlip xmlns:asvg="http://schemas.microsoft.com/office/drawing/2016/SVG/main" r:embed="rId6"/>
-              </a:ext>
-            </a:extLst>
-          </a:blip>
-          <a:stretch>
-            <a:fillRect/>
-          </a:stretch>
-        </a:blipFill>
-        <a:ln>
-          <a:noFill/>
-        </a:ln>
-      </dgm:spPr>
-      <dgm:extLst>
-        <a:ext uri="{E40237B7-FDA0-4F09-8148-C483321AD2D9}">
-          <dgm14:cNvPr xmlns:dgm14="http://schemas.microsoft.com/office/drawing/2010/diagram" id="0" name="" descr="Processor"/>
-        </a:ext>
-      </dgm:extLst>
-    </dgm:pt>
-    <dgm:pt modelId="{B903624B-1904-4CF3-BB3B-8B5DE4107C78}" type="pres">
-      <dgm:prSet presAssocID="{B05FC9FC-4D42-4FD7-82CC-2327FB5627FC}" presName="spaceRect" presStyleCnt="0"/>
-      <dgm:spPr/>
-    </dgm:pt>
-    <dgm:pt modelId="{A515E1C2-3C6D-46B4-BE73-2A4266295A53}" type="pres">
-      <dgm:prSet presAssocID="{B05FC9FC-4D42-4FD7-82CC-2327FB5627FC}" presName="parTx" presStyleLbl="revTx" presStyleIdx="2" presStyleCnt="3">
-        <dgm:presLayoutVars>
-          <dgm:chMax val="0"/>
-          <dgm:chPref val="0"/>
-        </dgm:presLayoutVars>
-      </dgm:prSet>
-      <dgm:spPr/>
-    </dgm:pt>
-  </dgm:ptLst>
-  <dgm:cxnLst>
-    <dgm:cxn modelId="{9FBC2A1E-74CB-406E-8891-50754DD3E872}" type="presOf" srcId="{B05FC9FC-4D42-4FD7-82CC-2327FB5627FC}" destId="{A515E1C2-3C6D-46B4-BE73-2A4266295A53}" srcOrd="0" destOrd="0" presId="urn:microsoft.com/office/officeart/2018/2/layout/IconVerticalSolidList"/>
-    <dgm:cxn modelId="{A48A9920-64C3-4856-8AD8-AC9C2B3154DB}" type="presOf" srcId="{AB236E87-7C08-45F6-83D2-28399A468689}" destId="{548E80D3-43E4-42A7-BBD0-D150DA1F878F}" srcOrd="0" destOrd="0" presId="urn:microsoft.com/office/officeart/2018/2/layout/IconVerticalSolidList"/>
-    <dgm:cxn modelId="{326F595F-28E4-4AC7-87D6-DAE586A22229}" type="presOf" srcId="{F8C1B19B-CCFF-4DA1-837A-A5335431493E}" destId="{8084384F-827D-41D8-8AAC-5A48AAEE1A24}" srcOrd="0" destOrd="0" presId="urn:microsoft.com/office/officeart/2018/2/layout/IconVerticalSolidList"/>
-    <dgm:cxn modelId="{C9C13F66-74CE-405C-8C71-57CFCFB99B0D}" type="presOf" srcId="{F5C4C477-8C76-496C-A037-4AF7305E2776}" destId="{F867A84C-16F0-4374-A16E-7B45A70E2ECC}" srcOrd="0" destOrd="0" presId="urn:microsoft.com/office/officeart/2018/2/layout/IconVerticalSolidList"/>
-    <dgm:cxn modelId="{19467884-16E4-4128-A4EC-6A1EDDE598A9}" srcId="{F8C1B19B-CCFF-4DA1-837A-A5335431493E}" destId="{B05FC9FC-4D42-4FD7-82CC-2327FB5627FC}" srcOrd="2" destOrd="0" parTransId="{76F64A43-390D-4E4D-B100-395E159E4E5C}" sibTransId="{12E2E7CA-C44B-4475-9910-B987DF7BF875}"/>
-    <dgm:cxn modelId="{14BA60D5-BA69-40AF-8E60-392DDD7F24DC}" srcId="{F8C1B19B-CCFF-4DA1-837A-A5335431493E}" destId="{F5C4C477-8C76-496C-A037-4AF7305E2776}" srcOrd="1" destOrd="0" parTransId="{1CEBCB1D-DB11-4829-A696-6A1B7CDC66DE}" sibTransId="{89706E8D-2AB8-43A3-A94A-5E84F0DFA4F6}"/>
-    <dgm:cxn modelId="{CFB392ED-F237-413D-80C5-2A30961B0728}" srcId="{F8C1B19B-CCFF-4DA1-837A-A5335431493E}" destId="{AB236E87-7C08-45F6-83D2-28399A468689}" srcOrd="0" destOrd="0" parTransId="{5B9ED76D-82C3-4B5A-A82B-0195C90BD595}" sibTransId="{41A546E7-F3DC-453B-B3D3-2822E3411F1B}"/>
-    <dgm:cxn modelId="{F4ACCBD7-FD6F-4CAD-B7EC-FD7C0F73B21D}" type="presParOf" srcId="{8084384F-827D-41D8-8AAC-5A48AAEE1A24}" destId="{9ADF288C-4BFF-4A78-9B2E-72754A842ABC}" srcOrd="0" destOrd="0" presId="urn:microsoft.com/office/officeart/2018/2/layout/IconVerticalSolidList"/>
-    <dgm:cxn modelId="{71833DAA-D04A-483C-9C6E-65F3F635E480}" type="presParOf" srcId="{9ADF288C-4BFF-4A78-9B2E-72754A842ABC}" destId="{09D29445-C1A2-45FE-86ED-331FF6209ECE}" srcOrd="0" destOrd="0" presId="urn:microsoft.com/office/officeart/2018/2/layout/IconVerticalSolidList"/>
-    <dgm:cxn modelId="{AE232B84-4094-446E-884C-50087755E150}" type="presParOf" srcId="{9ADF288C-4BFF-4A78-9B2E-72754A842ABC}" destId="{DE4FF362-D79E-4DC3-A8A1-33C12F43CBC1}" srcOrd="1" destOrd="0" presId="urn:microsoft.com/office/officeart/2018/2/layout/IconVerticalSolidList"/>
-    <dgm:cxn modelId="{3FB97B7D-D8F8-478B-9A05-1FA6F2A724CC}" type="presParOf" srcId="{9ADF288C-4BFF-4A78-9B2E-72754A842ABC}" destId="{865E1BE7-9380-4D2C-AF39-C5300FD25B7B}" srcOrd="2" destOrd="0" presId="urn:microsoft.com/office/officeart/2018/2/layout/IconVerticalSolidList"/>
-    <dgm:cxn modelId="{D24A837A-930D-4CD5-8849-2143662B1893}" type="presParOf" srcId="{9ADF288C-4BFF-4A78-9B2E-72754A842ABC}" destId="{548E80D3-43E4-42A7-BBD0-D150DA1F878F}" srcOrd="3" destOrd="0" presId="urn:microsoft.com/office/officeart/2018/2/layout/IconVerticalSolidList"/>
-    <dgm:cxn modelId="{1156B63C-1CC4-49D5-95CF-10B45959688E}" type="presParOf" srcId="{8084384F-827D-41D8-8AAC-5A48AAEE1A24}" destId="{00EC7A83-736D-4C8D-8905-BB6D606E0684}" srcOrd="1" destOrd="0" presId="urn:microsoft.com/office/officeart/2018/2/layout/IconVerticalSolidList"/>
-    <dgm:cxn modelId="{A9AA85A1-DCD0-4306-8643-D2958539C0D4}" type="presParOf" srcId="{8084384F-827D-41D8-8AAC-5A48AAEE1A24}" destId="{EB66F22A-854A-46E2-8846-F3D83A57FC7C}" srcOrd="2" destOrd="0" presId="urn:microsoft.com/office/officeart/2018/2/layout/IconVerticalSolidList"/>
-    <dgm:cxn modelId="{1A15FB37-94F0-4AA6-995E-B85AE55431EF}" type="presParOf" srcId="{EB66F22A-854A-46E2-8846-F3D83A57FC7C}" destId="{62ACD6F9-A0DD-4D23-80FD-88EECDFD3006}" srcOrd="0" destOrd="0" presId="urn:microsoft.com/office/officeart/2018/2/layout/IconVerticalSolidList"/>
-    <dgm:cxn modelId="{A269177F-C924-4FC0-8E57-6581FA0A5DEA}" type="presParOf" srcId="{EB66F22A-854A-46E2-8846-F3D83A57FC7C}" destId="{B4DAAE97-0404-448C-801E-86FF86E92B6A}" srcOrd="1" destOrd="0" presId="urn:microsoft.com/office/officeart/2018/2/layout/IconVerticalSolidList"/>
-    <dgm:cxn modelId="{D653E193-28D6-4068-99AA-6393A9E4B25D}" type="presParOf" srcId="{EB66F22A-854A-46E2-8846-F3D83A57FC7C}" destId="{2156950D-F246-43A8-971B-6F8189EA8995}" srcOrd="2" destOrd="0" presId="urn:microsoft.com/office/officeart/2018/2/layout/IconVerticalSolidList"/>
-    <dgm:cxn modelId="{0B2AEB2C-EC8B-4B7B-84C9-193E7A622DBE}" type="presParOf" srcId="{EB66F22A-854A-46E2-8846-F3D83A57FC7C}" destId="{F867A84C-16F0-4374-A16E-7B45A70E2ECC}" srcOrd="3" destOrd="0" presId="urn:microsoft.com/office/officeart/2018/2/layout/IconVerticalSolidList"/>
-    <dgm:cxn modelId="{E72CBB03-1808-493D-AE89-19CA4B900DBE}" type="presParOf" srcId="{8084384F-827D-41D8-8AAC-5A48AAEE1A24}" destId="{11DFCDE5-1906-4296-941F-6FEFB42FC4EA}" srcOrd="3" destOrd="0" presId="urn:microsoft.com/office/officeart/2018/2/layout/IconVerticalSolidList"/>
-    <dgm:cxn modelId="{EA7E8CF8-F6F7-40C0-8E81-E0B69294C80A}" type="presParOf" srcId="{8084384F-827D-41D8-8AAC-5A48AAEE1A24}" destId="{4D028F42-2A3B-43B6-9F68-71E3BA279804}" srcOrd="4" destOrd="0" presId="urn:microsoft.com/office/officeart/2018/2/layout/IconVerticalSolidList"/>
-    <dgm:cxn modelId="{2AE394AC-1ADB-4593-A573-06DF72D2A32F}" type="presParOf" srcId="{4D028F42-2A3B-43B6-9F68-71E3BA279804}" destId="{F70CD3A0-8348-4EDC-978B-99BBB1A42A9A}" srcOrd="0" destOrd="0" presId="urn:microsoft.com/office/officeart/2018/2/layout/IconVerticalSolidList"/>
-    <dgm:cxn modelId="{D4F644B3-0155-4C77-8D35-5D77092DE6D3}" type="presParOf" srcId="{4D028F42-2A3B-43B6-9F68-71E3BA279804}" destId="{3277A205-9A39-40AB-B0CD-7457E5AE1562}" srcOrd="1" destOrd="0" presId="urn:microsoft.com/office/officeart/2018/2/layout/IconVerticalSolidList"/>
-    <dgm:cxn modelId="{57241B4D-D5FF-42ED-BD2D-9D373D4D836D}" type="presParOf" srcId="{4D028F42-2A3B-43B6-9F68-71E3BA279804}" destId="{B903624B-1904-4CF3-BB3B-8B5DE4107C78}" srcOrd="2" destOrd="0" presId="urn:microsoft.com/office/officeart/2018/2/layout/IconVerticalSolidList"/>
-    <dgm:cxn modelId="{0993A810-02D8-4504-BD62-411C4974CF3A}" type="presParOf" srcId="{4D028F42-2A3B-43B6-9F68-71E3BA279804}" destId="{A515E1C2-3C6D-46B4-BE73-2A4266295A53}" srcOrd="3" destOrd="0" presId="urn:microsoft.com/office/officeart/2018/2/layout/IconVerticalSolidList"/>
-  </dgm:cxnLst>
-  <dgm:bg/>
-  <dgm:whole/>
-  <dgm:extLst>
-    <a:ext uri="http://schemas.microsoft.com/office/drawing/2008/diagram">
-      <dsp:dataModelExt xmlns:dsp="http://schemas.microsoft.com/office/drawing/2008/diagram" relId="rId6" minVer="http://schemas.openxmlformats.org/drawingml/2006/diagram"/>
-    </a:ext>
-  </dgm:extLst>
-</dgm:dataModel>
-</file>
-
-<file path=ppt/diagrams/drawing1.xml><?xml version="1.0" encoding="utf-8"?>
-<dsp:drawing xmlns:dgm="http://schemas.openxmlformats.org/drawingml/2006/diagram" xmlns:dsp="http://schemas.microsoft.com/office/drawing/2008/diagram" xmlns:a="http://schemas.openxmlformats.org/drawingml/2006/main">
-  <dsp:spTree>
-    <dsp:nvGrpSpPr>
-      <dsp:cNvPr id="0" name=""/>
-      <dsp:cNvGrpSpPr/>
-    </dsp:nvGrpSpPr>
-    <dsp:grpSpPr/>
-    <dsp:sp modelId="{09D29445-C1A2-45FE-86ED-331FF6209ECE}">
-      <dsp:nvSpPr>
-        <dsp:cNvPr id="0" name=""/>
-        <dsp:cNvSpPr/>
-      </dsp:nvSpPr>
-      <dsp:spPr>
-        <a:xfrm>
-          <a:off x="0" y="465"/>
-          <a:ext cx="9237662" cy="1088305"/>
-        </a:xfrm>
-        <a:prstGeom prst="roundRect">
-          <a:avLst>
-            <a:gd name="adj" fmla="val 10000"/>
-          </a:avLst>
-        </a:prstGeom>
-        <a:solidFill>
-          <a:schemeClr val="bg1">
-            <a:lumMod val="95000"/>
-            <a:hueOff val="0"/>
-            <a:satOff val="0"/>
-            <a:lumOff val="0"/>
-            <a:alphaOff val="0"/>
-          </a:schemeClr>
-        </a:solidFill>
-        <a:ln>
-          <a:noFill/>
-        </a:ln>
-        <a:effectLst/>
-      </dsp:spPr>
-      <dsp:style>
-        <a:lnRef idx="0">
-          <a:scrgbClr r="0" g="0" b="0"/>
-        </a:lnRef>
-        <a:fillRef idx="1">
-          <a:scrgbClr r="0" g="0" b="0"/>
-        </a:fillRef>
-        <a:effectRef idx="0">
-          <a:scrgbClr r="0" g="0" b="0"/>
-        </a:effectRef>
-        <a:fontRef idx="minor"/>
-      </dsp:style>
-    </dsp:sp>
-    <dsp:sp modelId="{DE4FF362-D79E-4DC3-A8A1-33C12F43CBC1}">
-      <dsp:nvSpPr>
-        <dsp:cNvPr id="0" name=""/>
-        <dsp:cNvSpPr/>
-      </dsp:nvSpPr>
-      <dsp:spPr>
-        <a:xfrm>
-          <a:off x="329212" y="245333"/>
-          <a:ext cx="598568" cy="598568"/>
-        </a:xfrm>
-        <a:prstGeom prst="rect">
-          <a:avLst/>
-        </a:prstGeom>
-        <a:blipFill>
-          <a:blip xmlns:r="http://schemas.openxmlformats.org/officeDocument/2006/relationships" r:embed="rId1">
-            <a:extLst>
-              <a:ext uri="{28A0092B-C50C-407E-A947-70E740481C1C}">
-                <a14:useLocalDpi xmlns:a14="http://schemas.microsoft.com/office/drawing/2010/main" val="0"/>
-              </a:ext>
-              <a:ext uri="{96DAC541-7B7A-43D3-8B79-37D633B846F1}">
-                <asvg:svgBlip xmlns:asvg="http://schemas.microsoft.com/office/drawing/2016/SVG/main" r:embed="rId2"/>
-              </a:ext>
-            </a:extLst>
-          </a:blip>
-          <a:stretch>
-            <a:fillRect/>
-          </a:stretch>
-        </a:blipFill>
-        <a:ln w="12700" cap="flat" cmpd="sng" algn="ctr">
-          <a:noFill/>
-          <a:prstDash val="solid"/>
-          <a:miter lim="800000"/>
-        </a:ln>
-        <a:effectLst/>
-      </dsp:spPr>
-      <dsp:style>
-        <a:lnRef idx="2">
-          <a:scrgbClr r="0" g="0" b="0"/>
-        </a:lnRef>
-        <a:fillRef idx="1">
-          <a:scrgbClr r="0" g="0" b="0"/>
-        </a:fillRef>
-        <a:effectRef idx="0">
-          <a:scrgbClr r="0" g="0" b="0"/>
-        </a:effectRef>
-        <a:fontRef idx="minor">
-          <a:schemeClr val="lt1"/>
-        </a:fontRef>
-      </dsp:style>
-    </dsp:sp>
-    <dsp:sp modelId="{548E80D3-43E4-42A7-BBD0-D150DA1F878F}">
-      <dsp:nvSpPr>
-        <dsp:cNvPr id="0" name=""/>
-        <dsp:cNvSpPr/>
-      </dsp:nvSpPr>
-      <dsp:spPr>
-        <a:xfrm>
-          <a:off x="1256993" y="465"/>
-          <a:ext cx="7980668" cy="1088305"/>
-        </a:xfrm>
-        <a:prstGeom prst="rect">
-          <a:avLst/>
-        </a:prstGeom>
-        <a:noFill/>
-        <a:ln>
-          <a:noFill/>
-        </a:ln>
-        <a:effectLst/>
-      </dsp:spPr>
-      <dsp:style>
-        <a:lnRef idx="0">
-          <a:scrgbClr r="0" g="0" b="0"/>
-        </a:lnRef>
-        <a:fillRef idx="0">
-          <a:scrgbClr r="0" g="0" b="0"/>
-        </a:fillRef>
-        <a:effectRef idx="0">
-          <a:scrgbClr r="0" g="0" b="0"/>
-        </a:effectRef>
-        <a:fontRef idx="minor"/>
-      </dsp:style>
-      <dsp:txBody>
-        <a:bodyPr spcFirstLastPara="0" vert="horz" wrap="square" lIns="115179" tIns="115179" rIns="115179" bIns="115179" numCol="1" spcCol="1270" anchor="ctr" anchorCtr="0">
-          <a:noAutofit/>
-        </a:bodyPr>
-        <a:lstStyle/>
-        <a:p>
-          <a:pPr marL="0" lvl="0" indent="0" algn="l" defTabSz="1111250">
-            <a:lnSpc>
-              <a:spcPct val="90000"/>
-            </a:lnSpc>
-            <a:spcBef>
-              <a:spcPct val="0"/>
-            </a:spcBef>
-            <a:spcAft>
-              <a:spcPct val="35000"/>
-            </a:spcAft>
-            <a:buNone/>
-          </a:pPr>
-          <a:r>
-            <a:rPr lang="en-US" sz="2500" kern="1200"/>
-            <a:t>Malware is downloaded accidently</a:t>
-          </a:r>
-        </a:p>
-      </dsp:txBody>
-      <dsp:txXfrm>
-        <a:off x="1256993" y="465"/>
-        <a:ext cx="7980668" cy="1088305"/>
-      </dsp:txXfrm>
-    </dsp:sp>
-    <dsp:sp modelId="{62ACD6F9-A0DD-4D23-80FD-88EECDFD3006}">
-      <dsp:nvSpPr>
-        <dsp:cNvPr id="0" name=""/>
-        <dsp:cNvSpPr/>
-      </dsp:nvSpPr>
-      <dsp:spPr>
-        <a:xfrm>
-          <a:off x="0" y="1360847"/>
-          <a:ext cx="9237662" cy="1088305"/>
-        </a:xfrm>
-        <a:prstGeom prst="roundRect">
-          <a:avLst>
-            <a:gd name="adj" fmla="val 10000"/>
-          </a:avLst>
-        </a:prstGeom>
-        <a:solidFill>
-          <a:schemeClr val="bg1">
-            <a:lumMod val="95000"/>
-            <a:hueOff val="0"/>
-            <a:satOff val="0"/>
-            <a:lumOff val="0"/>
-            <a:alphaOff val="0"/>
-          </a:schemeClr>
-        </a:solidFill>
-        <a:ln>
-          <a:noFill/>
-        </a:ln>
-        <a:effectLst/>
-      </dsp:spPr>
-      <dsp:style>
-        <a:lnRef idx="0">
-          <a:scrgbClr r="0" g="0" b="0"/>
-        </a:lnRef>
-        <a:fillRef idx="1">
-          <a:scrgbClr r="0" g="0" b="0"/>
-        </a:fillRef>
-        <a:effectRef idx="0">
-          <a:scrgbClr r="0" g="0" b="0"/>
-        </a:effectRef>
-        <a:fontRef idx="minor"/>
-      </dsp:style>
-    </dsp:sp>
-    <dsp:sp modelId="{B4DAAE97-0404-448C-801E-86FF86E92B6A}">
-      <dsp:nvSpPr>
-        <dsp:cNvPr id="0" name=""/>
-        <dsp:cNvSpPr/>
-      </dsp:nvSpPr>
-      <dsp:spPr>
-        <a:xfrm>
-          <a:off x="329212" y="1605715"/>
-          <a:ext cx="598568" cy="598568"/>
-        </a:xfrm>
-        <a:prstGeom prst="rect">
-          <a:avLst/>
-        </a:prstGeom>
-        <a:blipFill>
-          <a:blip xmlns:r="http://schemas.openxmlformats.org/officeDocument/2006/relationships" r:embed="rId3">
-            <a:extLst>
-              <a:ext uri="{28A0092B-C50C-407E-A947-70E740481C1C}">
-                <a14:useLocalDpi xmlns:a14="http://schemas.microsoft.com/office/drawing/2010/main" val="0"/>
-              </a:ext>
-              <a:ext uri="{96DAC541-7B7A-43D3-8B79-37D633B846F1}">
-                <asvg:svgBlip xmlns:asvg="http://schemas.microsoft.com/office/drawing/2016/SVG/main" r:embed="rId4"/>
-              </a:ext>
-            </a:extLst>
-          </a:blip>
-          <a:stretch>
-            <a:fillRect/>
-          </a:stretch>
-        </a:blipFill>
-        <a:ln w="12700" cap="flat" cmpd="sng" algn="ctr">
-          <a:noFill/>
-          <a:prstDash val="solid"/>
-          <a:miter lim="800000"/>
-        </a:ln>
-        <a:effectLst/>
-      </dsp:spPr>
-      <dsp:style>
-        <a:lnRef idx="2">
-          <a:scrgbClr r="0" g="0" b="0"/>
-        </a:lnRef>
-        <a:fillRef idx="1">
-          <a:scrgbClr r="0" g="0" b="0"/>
-        </a:fillRef>
-        <a:effectRef idx="0">
-          <a:scrgbClr r="0" g="0" b="0"/>
-        </a:effectRef>
-        <a:fontRef idx="minor">
-          <a:schemeClr val="lt1"/>
-        </a:fontRef>
-      </dsp:style>
-    </dsp:sp>
-    <dsp:sp modelId="{F867A84C-16F0-4374-A16E-7B45A70E2ECC}">
-      <dsp:nvSpPr>
-        <dsp:cNvPr id="0" name=""/>
-        <dsp:cNvSpPr/>
-      </dsp:nvSpPr>
-      <dsp:spPr>
-        <a:xfrm>
-          <a:off x="1256993" y="1360847"/>
-          <a:ext cx="7980668" cy="1088305"/>
-        </a:xfrm>
-        <a:prstGeom prst="rect">
-          <a:avLst/>
-        </a:prstGeom>
-        <a:noFill/>
-        <a:ln>
-          <a:noFill/>
-        </a:ln>
-        <a:effectLst/>
-      </dsp:spPr>
-      <dsp:style>
-        <a:lnRef idx="0">
-          <a:scrgbClr r="0" g="0" b="0"/>
-        </a:lnRef>
-        <a:fillRef idx="0">
-          <a:scrgbClr r="0" g="0" b="0"/>
-        </a:fillRef>
-        <a:effectRef idx="0">
-          <a:scrgbClr r="0" g="0" b="0"/>
-        </a:effectRef>
-        <a:fontRef idx="minor"/>
-      </dsp:style>
-      <dsp:txBody>
-        <a:bodyPr spcFirstLastPara="0" vert="horz" wrap="square" lIns="115179" tIns="115179" rIns="115179" bIns="115179" numCol="1" spcCol="1270" anchor="ctr" anchorCtr="0">
-          <a:noAutofit/>
-        </a:bodyPr>
-        <a:lstStyle/>
-        <a:p>
-          <a:pPr marL="0" lvl="0" indent="0" algn="l" defTabSz="1111250">
-            <a:lnSpc>
-              <a:spcPct val="90000"/>
-            </a:lnSpc>
-            <a:spcBef>
-              <a:spcPct val="0"/>
-            </a:spcBef>
-            <a:spcAft>
-              <a:spcPct val="35000"/>
-            </a:spcAft>
-            <a:buNone/>
-          </a:pPr>
-          <a:r>
-            <a:rPr lang="en-US" sz="2500" kern="1200"/>
-            <a:t>Theft caused by malware can cost money and computers' capabilities</a:t>
-          </a:r>
-        </a:p>
-      </dsp:txBody>
-      <dsp:txXfrm>
-        <a:off x="1256993" y="1360847"/>
-        <a:ext cx="7980668" cy="1088305"/>
-      </dsp:txXfrm>
-    </dsp:sp>
-    <dsp:sp modelId="{F70CD3A0-8348-4EDC-978B-99BBB1A42A9A}">
-      <dsp:nvSpPr>
-        <dsp:cNvPr id="0" name=""/>
-        <dsp:cNvSpPr/>
-      </dsp:nvSpPr>
-      <dsp:spPr>
-        <a:xfrm>
-          <a:off x="0" y="2721229"/>
-          <a:ext cx="9237662" cy="1088305"/>
-        </a:xfrm>
-        <a:prstGeom prst="roundRect">
-          <a:avLst>
-            <a:gd name="adj" fmla="val 10000"/>
-          </a:avLst>
-        </a:prstGeom>
-        <a:solidFill>
-          <a:schemeClr val="bg1">
-            <a:lumMod val="95000"/>
-            <a:hueOff val="0"/>
-            <a:satOff val="0"/>
-            <a:lumOff val="0"/>
-            <a:alphaOff val="0"/>
-          </a:schemeClr>
-        </a:solidFill>
-        <a:ln>
-          <a:noFill/>
-        </a:ln>
-        <a:effectLst/>
-      </dsp:spPr>
-      <dsp:style>
-        <a:lnRef idx="0">
-          <a:scrgbClr r="0" g="0" b="0"/>
-        </a:lnRef>
-        <a:fillRef idx="1">
-          <a:scrgbClr r="0" g="0" b="0"/>
-        </a:fillRef>
-        <a:effectRef idx="0">
-          <a:scrgbClr r="0" g="0" b="0"/>
-        </a:effectRef>
-        <a:fontRef idx="minor"/>
-      </dsp:style>
-    </dsp:sp>
-    <dsp:sp modelId="{3277A205-9A39-40AB-B0CD-7457E5AE1562}">
-      <dsp:nvSpPr>
-        <dsp:cNvPr id="0" name=""/>
-        <dsp:cNvSpPr/>
-      </dsp:nvSpPr>
-      <dsp:spPr>
-        <a:xfrm>
-          <a:off x="329212" y="2966098"/>
-          <a:ext cx="598568" cy="598568"/>
-        </a:xfrm>
-        <a:prstGeom prst="rect">
-          <a:avLst/>
-        </a:prstGeom>
-        <a:blipFill>
-          <a:blip xmlns:r="http://schemas.openxmlformats.org/officeDocument/2006/relationships" r:embed="rId5">
-            <a:extLst>
-              <a:ext uri="{28A0092B-C50C-407E-A947-70E740481C1C}">
-                <a14:useLocalDpi xmlns:a14="http://schemas.microsoft.com/office/drawing/2010/main" val="0"/>
-              </a:ext>
-              <a:ext uri="{96DAC541-7B7A-43D3-8B79-37D633B846F1}">
-                <asvg:svgBlip xmlns:asvg="http://schemas.microsoft.com/office/drawing/2016/SVG/main" r:embed="rId6"/>
-              </a:ext>
-            </a:extLst>
-          </a:blip>
-          <a:stretch>
-            <a:fillRect/>
-          </a:stretch>
-        </a:blipFill>
-        <a:ln w="12700" cap="flat" cmpd="sng" algn="ctr">
-          <a:noFill/>
-          <a:prstDash val="solid"/>
-          <a:miter lim="800000"/>
-        </a:ln>
-        <a:effectLst/>
-      </dsp:spPr>
-      <dsp:style>
-        <a:lnRef idx="2">
-          <a:scrgbClr r="0" g="0" b="0"/>
-        </a:lnRef>
-        <a:fillRef idx="1">
-          <a:scrgbClr r="0" g="0" b="0"/>
-        </a:fillRef>
-        <a:effectRef idx="0">
-          <a:scrgbClr r="0" g="0" b="0"/>
-        </a:effectRef>
-        <a:fontRef idx="minor">
-          <a:schemeClr val="lt1"/>
-        </a:fontRef>
-      </dsp:style>
-    </dsp:sp>
-    <dsp:sp modelId="{A515E1C2-3C6D-46B4-BE73-2A4266295A53}">
-      <dsp:nvSpPr>
-        <dsp:cNvPr id="0" name=""/>
-        <dsp:cNvSpPr/>
-      </dsp:nvSpPr>
-      <dsp:spPr>
-        <a:xfrm>
-          <a:off x="1256993" y="2721229"/>
-          <a:ext cx="7980668" cy="1088305"/>
-        </a:xfrm>
-        <a:prstGeom prst="rect">
-          <a:avLst/>
-        </a:prstGeom>
-        <a:noFill/>
-        <a:ln>
-          <a:noFill/>
-        </a:ln>
-        <a:effectLst/>
-      </dsp:spPr>
-      <dsp:style>
-        <a:lnRef idx="0">
-          <a:scrgbClr r="0" g="0" b="0"/>
-        </a:lnRef>
-        <a:fillRef idx="0">
-          <a:scrgbClr r="0" g="0" b="0"/>
-        </a:fillRef>
-        <a:effectRef idx="0">
-          <a:scrgbClr r="0" g="0" b="0"/>
-        </a:effectRef>
-        <a:fontRef idx="minor"/>
-      </dsp:style>
-      <dsp:txBody>
-        <a:bodyPr spcFirstLastPara="0" vert="horz" wrap="square" lIns="115179" tIns="115179" rIns="115179" bIns="115179" numCol="1" spcCol="1270" anchor="ctr" anchorCtr="0">
-          <a:noAutofit/>
-        </a:bodyPr>
-        <a:lstStyle/>
-        <a:p>
-          <a:pPr marL="0" lvl="0" indent="0" algn="l" defTabSz="1111250">
-            <a:lnSpc>
-              <a:spcPct val="90000"/>
-            </a:lnSpc>
-            <a:spcBef>
-              <a:spcPct val="0"/>
-            </a:spcBef>
-            <a:spcAft>
-              <a:spcPct val="35000"/>
-            </a:spcAft>
-            <a:buNone/>
-          </a:pPr>
-          <a:r>
-            <a:rPr lang="en-US" sz="2500" kern="1200"/>
-            <a:t>Malware can look just like good-ware, but it is misleading</a:t>
-          </a:r>
-        </a:p>
-      </dsp:txBody>
-      <dsp:txXfrm>
-        <a:off x="1256993" y="2721229"/>
-        <a:ext cx="7980668" cy="1088305"/>
-      </dsp:txXfrm>
-    </dsp:sp>
-  </dsp:spTree>
-</dsp:drawing>
-</file>
-
-<file path=ppt/diagrams/layout1.xml><?xml version="1.0" encoding="utf-8"?>
-<dgm:layoutDef xmlns:dgm="http://schemas.openxmlformats.org/drawingml/2006/diagram" xmlns:a="http://schemas.openxmlformats.org/drawingml/2006/main" uniqueId="urn:microsoft.com/office/officeart/2018/2/layout/IconVerticalSolidList">
-  <dgm:title val="Icon Vertical Solid List"/>
-  <dgm:desc val="Use to show a series of visuals from top to bottom with Level 1 or Level 1 and Level 2 text grouped in a shape. Works best with icons or small pictures with lengthier descriptions."/>
-  <dgm:catLst>
-    <dgm:cat type="icon" pri="500"/>
-  </dgm:catLst>
-  <dgm:sampData useDef="1">
-    <dgm:dataModel>
-      <dgm:ptLst/>
-      <dgm:bg/>
-      <dgm:whole/>
-    </dgm:dataModel>
-  </dgm:sampData>
-  <dgm:styleData useDef="1">
-    <dgm:dataModel>
-      <dgm:ptLst/>
-      <dgm:bg/>
-      <dgm:whole/>
-    </dgm:dataModel>
-  </dgm:styleData>
-  <dgm:clrData useDef="1">
-    <dgm:dataModel>
-      <dgm:ptLst/>
-      <dgm:bg/>
-      <dgm:whole/>
-    </dgm:dataModel>
-  </dgm:clrData>
-  <dgm:layoutNode name="root">
-    <dgm:varLst>
-      <dgm:dir/>
-      <dgm:resizeHandles val="exact"/>
-    </dgm:varLst>
-    <dgm:choose name="Name0">
-      <dgm:if name="Name1" axis="self" func="var" arg="dir" op="equ" val="norm">
-        <dgm:alg type="lin">
-          <dgm:param type="linDir" val="fromT"/>
-          <dgm:param type="nodeHorzAlign" val="l"/>
-        </dgm:alg>
-      </dgm:if>
-      <dgm:else name="Name2">
-        <dgm:alg type="lin">
-          <dgm:param type="linDir" val="fromT"/>
-          <dgm:param type="nodeHorzAlign" val="r"/>
-        </dgm:alg>
-      </dgm:else>
-    </dgm:choose>
-    <dgm:shape xmlns:r="http://schemas.openxmlformats.org/officeDocument/2006/relationships" r:blip="">
-      <dgm:adjLst/>
-    </dgm:shape>
-    <dgm:presOf/>
-    <dgm:choose name="Name3">
-      <dgm:if name="Name4" axis="ch" ptType="node" func="cnt" op="lte" val="3">
-        <dgm:constrLst>
-          <dgm:constr type="h" for="ch" forName="compNode" refType="h" fact="0.3"/>
-          <dgm:constr type="w" for="ch" forName="compNode" refType="w"/>
-          <dgm:constr type="h" for="ch" forName="sibTrans" refType="h" refFor="ch" refForName="compNode" fact="0.25"/>
-          <dgm:constr type="primFontSz" for="des" forName="parTx" val="25"/>
-          <dgm:constr type="primFontSz" for="des" forName="desTx" refType="primFontSz" refFor="des" refForName="parTx" op="lte" fact="0.75"/>
-          <dgm:constr type="h" for="des" forName="compNode" op="equ"/>
-          <dgm:constr type="h" for="des" forName="bgRect" op="equ"/>
-          <dgm:constr type="h" for="des" forName="iconRect" op="equ"/>
-          <dgm:constr type="w" for="des" forName="iconRect" op="equ"/>
-          <dgm:constr type="h" for="des" forName="spaceRect" op="equ"/>
-          <dgm:constr type="h" for="des" forName="parTx" op="equ"/>
-          <dgm:constr type="h" for="des" forName="desTx" op="equ"/>
-        </dgm:constrLst>
-      </dgm:if>
-      <dgm:if name="Name5" axis="ch" ptType="node" func="cnt" op="lte" val="4">
-        <dgm:constrLst>
-          <dgm:constr type="h" for="ch" forName="compNode" refType="h" fact="0.3"/>
-          <dgm:constr type="w" for="ch" forName="compNode" refType="w"/>
-          <dgm:constr type="h" for="ch" forName="sibTrans" refType="h" refFor="ch" refForName="compNode" fact="0.25"/>
-          <dgm:constr type="primFontSz" for="des" forName="parTx" val="22"/>
-          <dgm:constr type="primFontSz" for="des" forName="desTx" refType="primFontSz" refFor="des" refForName="parTx" op="lte" fact="0.75"/>
-          <dgm:constr type="h" for="des" forName="compNode" op="equ"/>
-          <dgm:constr type="h" for="des" forName="bgRect" op="equ"/>
-          <dgm:constr type="h" for="des" forName="iconRect" op="equ"/>
-          <dgm:constr type="w" for="des" forName="iconRect" op="equ"/>
-          <dgm:constr type="h" for="des" forName="spaceRect" op="equ"/>
-          <dgm:constr type="h" for="des" forName="parTx" op="equ"/>
-          <dgm:constr type="h" for="des" forName="desTx" op="equ"/>
-        </dgm:constrLst>
-      </dgm:if>
-      <dgm:if name="Name6" axis="ch" ptType="node" func="cnt" op="lte" val="6">
-        <dgm:constrLst>
-          <dgm:constr type="h" for="ch" forName="compNode" refType="h" fact="0.3"/>
-          <dgm:constr type="w" for="ch" forName="compNode" refType="w"/>
-          <dgm:constr type="h" for="ch" forName="sibTrans" refType="h" refFor="ch" refForName="compNode" fact="0.25"/>
-          <dgm:constr type="primFontSz" for="des" forName="parTx" val="19"/>
-          <dgm:constr type="primFontSz" for="des" forName="desTx" refType="primFontSz" refFor="des" refForName="parTx" op="lte" fact="0.75"/>
-          <dgm:constr type="h" for="des" forName="compNode" op="equ"/>
-          <dgm:constr type="h" for="des" forName="bgRect" op="equ"/>
-          <dgm:constr type="h" for="des" forName="iconRect" op="equ"/>
-          <dgm:constr type="w" for="des" forName="iconRect" op="equ"/>
-          <dgm:constr type="h" for="des" forName="spaceRect" op="equ"/>
-          <dgm:constr type="h" for="des" forName="parTx" op="equ"/>
-          <dgm:constr type="h" for="des" forName="desTx" op="equ"/>
-        </dgm:constrLst>
-      </dgm:if>
-      <dgm:else name="Name7">
-        <dgm:constrLst>
-          <dgm:constr type="h" for="ch" forName="compNode" refType="h" fact="0.3"/>
-          <dgm:constr type="w" for="ch" forName="compNode" refType="w"/>
-          <dgm:constr type="h" for="ch" forName="sibTrans" refType="h" refFor="ch" refForName="compNode" fact="0.25"/>
-          <dgm:constr type="primFontSz" for="des" forName="parTx" val="16"/>
-          <dgm:constr type="primFontSz" for="des" forName="desTx" refType="primFontSz" refFor="des" refForName="parTx" op="lte" fact="0.75"/>
-          <dgm:constr type="h" for="des" forName="compNode" op="equ"/>
-          <dgm:constr type="h" for="des" forName="bgRect" op="equ"/>
-          <dgm:constr type="h" for="des" forName="iconRect" op="equ"/>
-          <dgm:constr type="w" for="des" forName="iconRect" op="equ"/>
-          <dgm:constr type="h" for="des" forName="spaceRect" op="equ"/>
-          <dgm:constr type="h" for="des" forName="parTx" op="equ"/>
-          <dgm:constr type="h" for="des" forName="desTx" op="equ"/>
-        </dgm:constrLst>
-      </dgm:else>
-    </dgm:choose>
-    <dgm:ruleLst>
-      <dgm:rule type="h" for="ch" forName="compNode" val="0" fact="NaN" max="NaN"/>
-    </dgm:ruleLst>
-    <dgm:forEach name="Name8" axis="ch" ptType="node">
-      <dgm:layoutNode name="compNode">
-        <dgm:alg type="composite"/>
-        <dgm:shape xmlns:r="http://schemas.openxmlformats.org/officeDocument/2006/relationships" r:blip="">
-          <dgm:adjLst/>
-        </dgm:shape>
-        <dgm:presOf axis="self"/>
-        <dgm:choose name="Name9">
-          <dgm:if name="Name10" axis="ch" ptType="node" func="cnt" op="gte" val="1">
-            <dgm:constrLst>
-              <dgm:constr type="w" for="ch" forName="bgRect" refType="w"/>
-              <dgm:constr type="h" for="ch" forName="bgRect" refType="h"/>
-              <dgm:constr type="l" for="ch" forName="bgRect"/>
-              <dgm:constr type="t" for="ch" forName="bgRect"/>
-              <dgm:constr type="h" for="ch" forName="iconRect" refType="h" fact="0.55"/>
-              <dgm:constr type="w" for="ch" forName="iconRect" refType="h" refFor="ch" refForName="iconRect"/>
-              <dgm:constr type="l" for="ch" forName="iconRect" refType="h" refFor="ch" refForName="iconRect" fact="0.55"/>
-              <dgm:constr type="ctrY" for="ch" forName="iconRect" refType="ctrY" refFor="ch" refForName="bgRect"/>
-              <dgm:constr type="w" for="ch" forName="spaceRect" refType="l" refFor="ch" refForName="iconRect"/>
-              <dgm:constr type="h" for="ch" forName="spaceRect" refType="h"/>
-              <dgm:constr type="l" for="ch" forName="spaceRect" refType="r" refFor="ch" refForName="iconRect"/>
-              <dgm:constr type="t" for="ch" forName="spaceRect"/>
-              <dgm:constr type="w" for="ch" forName="parTx" refType="w" fact="0.45"/>
-              <dgm:constr type="h" for="ch" forName="parTx" refType="h"/>
-              <dgm:constr type="l" for="ch" forName="parTx" refType="r" refFor="ch" refForName="spaceRect"/>
-              <dgm:constr type="t" for="ch" forName="parTx"/>
-              <dgm:constr type="h" for="ch" forName="desTx" refType="h"/>
-              <dgm:constr type="l" for="ch" forName="desTx" refType="r" refFor="ch" refForName="parTx"/>
-              <dgm:constr type="t" for="ch" forName="desTx"/>
-            </dgm:constrLst>
-          </dgm:if>
-          <dgm:else name="Name11">
-            <dgm:constrLst>
-              <dgm:constr type="w" for="ch" forName="bgRect" refType="w"/>
-              <dgm:constr type="h" for="ch" forName="bgRect" refType="h"/>
-              <dgm:constr type="l" for="ch" forName="bgRect"/>
-              <dgm:constr type="t" for="ch" forName="bgRect"/>
-              <dgm:constr type="h" for="ch" forName="iconRect" refType="h" fact="0.55"/>
-              <dgm:constr type="w" for="ch" forName="iconRect" refType="h" refFor="ch" refForName="iconRect"/>
-              <dgm:constr type="l" for="ch" forName="iconRect" refType="h" refFor="ch" refForName="iconRect" fact="0.55"/>
-              <dgm:constr type="ctrY" for="ch" forName="iconRect" refType="ctrY" refFor="ch" refForName="bgRect"/>
-              <dgm:constr type="w" for="ch" forName="spaceRect" refType="l" refFor="ch" refForName="iconRect"/>
-              <dgm:constr type="h" for="ch" forName="spaceRect" refType="h"/>
-              <dgm:constr type="l" for="ch" forName="spaceRect" refType="r" refFor="ch" refForName="iconRect"/>
-              <dgm:constr type="t" for="ch" forName="spaceRect"/>
-              <dgm:constr type="h" for="ch" forName="parTx" refType="h"/>
-              <dgm:constr type="l" for="ch" forName="parTx" refType="r" refFor="ch" refForName="spaceRect"/>
-              <dgm:constr type="t" for="ch" forName="parTx"/>
-            </dgm:constrLst>
-          </dgm:else>
-        </dgm:choose>
-        <dgm:ruleLst>
-          <dgm:rule type="h" val="INF" fact="NaN" max="NaN"/>
-        </dgm:ruleLst>
-        <dgm:layoutNode name="bgRect" styleLbl="bgShp">
-          <dgm:alg type="sp"/>
-          <dgm:shape xmlns:r="http://schemas.openxmlformats.org/officeDocument/2006/relationships" type="roundRect" r:blip="">
-            <dgm:adjLst>
-              <dgm:adj idx="1" val="0.1"/>
-            </dgm:adjLst>
-          </dgm:shape>
-          <dgm:presOf/>
-          <dgm:constrLst/>
-          <dgm:ruleLst/>
-        </dgm:layoutNode>
-        <dgm:layoutNode name="iconRect" styleLbl="node1">
-          <dgm:alg type="sp"/>
-          <dgm:shape xmlns:r="http://schemas.openxmlformats.org/officeDocument/2006/relationships" type="rect" r:blip="" blipPhldr="1">
-            <dgm:adjLst/>
-          </dgm:shape>
-          <dgm:presOf/>
-          <dgm:constrLst/>
-          <dgm:ruleLst/>
-        </dgm:layoutNode>
-        <dgm:layoutNode name="spaceRect">
-          <dgm:alg type="sp"/>
-          <dgm:shape xmlns:r="http://schemas.openxmlformats.org/officeDocument/2006/relationships" r:blip="">
-            <dgm:adjLst/>
-          </dgm:shape>
-          <dgm:presOf/>
-          <dgm:constrLst/>
-          <dgm:ruleLst/>
-        </dgm:layoutNode>
-        <dgm:layoutNode name="parTx" styleLbl="revTx">
-          <dgm:varLst>
-            <dgm:chMax val="0"/>
-            <dgm:chPref val="0"/>
-          </dgm:varLst>
-          <dgm:alg type="tx">
-            <dgm:param type="txAnchorVert" val="mid"/>
-            <dgm:param type="parTxLTRAlign" val="l"/>
-            <dgm:param type="shpTxLTRAlignCh" val="l"/>
-            <dgm:param type="parTxRTLAlign" val="r"/>
-            <dgm:param type="shpTxRTLAlignCh" val="r"/>
-          </dgm:alg>
-          <dgm:shape xmlns:r="http://schemas.openxmlformats.org/officeDocument/2006/relationships" type="rect" r:blip="">
-            <dgm:adjLst/>
-          </dgm:shape>
-          <dgm:presOf axis="self" ptType="node"/>
-          <dgm:constrLst>
-            <dgm:constr type="lMarg" refType="h" fact="0.3"/>
-            <dgm:constr type="rMarg" refType="h" fact="0.3"/>
-            <dgm:constr type="tMarg" refType="h" fact="0.3"/>
-            <dgm:constr type="bMarg" refType="h" fact="0.3"/>
-          </dgm:constrLst>
-          <dgm:ruleLst>
-            <dgm:rule type="primFontSz" val="14" fact="NaN" max="NaN"/>
-            <dgm:rule type="h" val="INF" fact="NaN" max="NaN"/>
-          </dgm:ruleLst>
-        </dgm:layoutNode>
-        <dgm:choose name="Name12">
-          <dgm:if name="Name13" axis="ch" ptType="node" func="cnt" op="gte" val="1">
-            <dgm:layoutNode name="desTx" styleLbl="revTx">
-              <dgm:varLst/>
-              <dgm:alg type="tx">
-                <dgm:param type="txAnchorVertCh" val="mid"/>
-                <dgm:param type="parTxLTRAlign" val="l"/>
-                <dgm:param type="shpTxLTRAlignCh" val="l"/>
-                <dgm:param type="parTxRTLAlign" val="r"/>
-                <dgm:param type="shpTxRTLAlignCh" val="r"/>
-                <dgm:param type="stBulletLvl" val="0"/>
-              </dgm:alg>
-              <dgm:shape xmlns:r="http://schemas.openxmlformats.org/officeDocument/2006/relationships" type="rect" r:blip="">
-                <dgm:adjLst/>
-              </dgm:shape>
-              <dgm:presOf axis="des" ptType="node"/>
-              <dgm:constrLst>
-                <dgm:constr type="primFontSz" val="18"/>
-                <dgm:constr type="secFontSz" refType="primFontSz"/>
-                <dgm:constr type="lMarg" refType="h" fact="0.3"/>
-                <dgm:constr type="rMarg" refType="h" fact="0.3"/>
-                <dgm:constr type="tMarg" refType="h" fact="0.3"/>
-                <dgm:constr type="bMarg" refType="h" fact="0.3"/>
-              </dgm:constrLst>
-              <dgm:ruleLst>
-                <dgm:rule type="primFontSz" val="11" fact="NaN" max="NaN"/>
-              </dgm:ruleLst>
-            </dgm:layoutNode>
-          </dgm:if>
-          <dgm:else name="Name14"/>
-        </dgm:choose>
-      </dgm:layoutNode>
-      <dgm:forEach name="Name15" axis="followSib" ptType="sibTrans" cnt="1">
-        <dgm:layoutNode name="sibTrans">
-          <dgm:alg type="sp"/>
-          <dgm:shape xmlns:r="http://schemas.openxmlformats.org/officeDocument/2006/relationships" r:blip="">
-            <dgm:adjLst/>
-          </dgm:shape>
-          <dgm:presOf axis="self"/>
-          <dgm:constrLst/>
-          <dgm:ruleLst/>
-        </dgm:layoutNode>
-      </dgm:forEach>
-    </dgm:forEach>
-  </dgm:layoutNode>
-  <dgm:extLst>
-    <a:ext uri="{68A01E43-0DF5-4B5B-8FA6-DAF915123BFB}">
-      <dgm1612:lstStyle xmlns:dgm1612="http://schemas.microsoft.com/office/drawing/2016/12/diagram">
-        <a:lvl1pPr>
-          <a:lnSpc>
-            <a:spcPct val="100000"/>
-          </a:lnSpc>
-        </a:lvl1pPr>
-        <a:lvl2pPr>
-          <a:lnSpc>
-            <a:spcPct val="100000"/>
-          </a:lnSpc>
-        </a:lvl2pPr>
-      </dgm1612:lstStyle>
-    </a:ext>
-  </dgm:extLst>
-</dgm:layoutDef>
-</file>
-
-<file path=ppt/diagrams/quickStyle1.xml><?xml version="1.0" encoding="utf-8"?>
-<dgm:styleDef xmlns:dgm="http://schemas.openxmlformats.org/drawingml/2006/diagram" xmlns:a="http://schemas.openxmlformats.org/drawingml/2006/main" uniqueId="urn:microsoft.com/office/officeart/2005/8/quickstyle/simple1">
-  <dgm:title val=""/>
-  <dgm:desc val=""/>
-  <dgm:catLst>
-    <dgm:cat type="simple" pri="10100"/>
-  </dgm:catLst>
-  <dgm:scene3d>
-    <a:camera prst="orthographicFront"/>
-    <a:lightRig rig="threePt" dir="t"/>
-  </dgm:scene3d>
-  <dgm:styleLbl name="node0">
-    <dgm:scene3d>
-      <a:camera prst="orthographicFront"/>
-      <a:lightRig rig="threePt" dir="t"/>
-    </dgm:scene3d>
-    <dgm:sp3d/>
-    <dgm:txPr/>
-    <dgm:style>
-      <a:lnRef idx="2">
-        <a:scrgbClr r="0" g="0" b="0"/>
-      </a:lnRef>
-      <a:fillRef idx="1">
-        <a:scrgbClr r="0" g="0" b="0"/>
-      </a:fillRef>
-      <a:effectRef idx="0">
-        <a:scrgbClr r="0" g="0" b="0"/>
-      </a:effectRef>
-      <a:fontRef idx="minor">
-        <a:schemeClr val="lt1"/>
-      </a:fontRef>
-    </dgm:style>
-  </dgm:styleLbl>
-  <dgm:styleLbl name="lnNode1">
-    <dgm:scene3d>
-      <a:camera prst="orthographicFront"/>
-      <a:lightRig rig="threePt" dir="t"/>
-    </dgm:scene3d>
-    <dgm:sp3d/>
-    <dgm:txPr/>
-    <dgm:style>
-      <a:lnRef idx="2">
-        <a:scrgbClr r="0" g="0" b="0"/>
-      </a:lnRef>
-      <a:fillRef idx="1">
-        <a:scrgbClr r="0" g="0" b="0"/>
-      </a:fillRef>
-      <a:effectRef idx="0">
-        <a:scrgbClr r="0" g="0" b="0"/>
-      </a:effectRef>
-      <a:fontRef idx="minor">
-        <a:schemeClr val="lt1"/>
-      </a:fontRef>
-    </dgm:style>
-  </dgm:styleLbl>
-  <dgm:styleLbl name="vennNode1">
-    <dgm:scene3d>
-      <a:camera prst="orthographicFront"/>
-      <a:lightRig rig="threePt" dir="t"/>
-    </dgm:scene3d>
-    <dgm:sp3d/>
-    <dgm:txPr/>
-    <dgm:style>
-      <a:lnRef idx="2">
-        <a:scrgbClr r="0" g="0" b="0"/>
-      </a:lnRef>
-      <a:fillRef idx="1">
-        <a:scrgbClr r="0" g="0" b="0"/>
-      </a:fillRef>
-      <a:effectRef idx="0">
-        <a:scrgbClr r="0" g="0" b="0"/>
-      </a:effectRef>
-      <a:fontRef idx="minor">
-        <a:schemeClr val="tx1"/>
-      </a:fontRef>
-    </dgm:style>
-  </dgm:styleLbl>
-  <dgm:styleLbl name="alignNode1">
-    <dgm:scene3d>
-      <a:camera prst="orthographicFront"/>
-      <a:lightRig rig="threePt" dir="t"/>
-    </dgm:scene3d>
-    <dgm:sp3d/>
-    <dgm:txPr/>
-    <dgm:style>
-      <a:lnRef idx="2">
-        <a:scrgbClr r="0" g="0" b="0"/>
-      </a:lnRef>
-      <a:fillRef idx="1">
-        <a:scrgbClr r="0" g="0" b="0"/>
-      </a:fillRef>
-      <a:effectRef idx="0">
-        <a:scrgbClr r="0" g="0" b="0"/>
-      </a:effectRef>
-      <a:fontRef idx="minor">
-        <a:schemeClr val="lt1"/>
-      </a:fontRef>
-    </dgm:style>
-  </dgm:styleLbl>
-  <dgm:styleLbl name="node1">
-    <dgm:scene3d>
-      <a:camera prst="orthographicFront"/>
-      <a:lightRig rig="threePt" dir="t"/>
-    </dgm:scene3d>
-    <dgm:sp3d/>
-    <dgm:txPr/>
-    <dgm:style>
-      <a:lnRef idx="2">
-        <a:scrgbClr r="0" g="0" b="0"/>
-      </a:lnRef>
-      <a:fillRef idx="1">
-        <a:scrgbClr r="0" g="0" b="0"/>
-      </a:fillRef>
-      <a:effectRef idx="0">
-        <a:scrgbClr r="0" g="0" b="0"/>
-      </a:effectRef>
-      <a:fontRef idx="minor">
-        <a:schemeClr val="lt1"/>
-      </a:fontRef>
-    </dgm:style>
-  </dgm:styleLbl>
-  <dgm:styleLbl name="node2">
-    <dgm:scene3d>
-      <a:camera prst="orthographicFront"/>
-      <a:lightRig rig="threePt" dir="t"/>
-    </dgm:scene3d>
-    <dgm:sp3d/>
-    <dgm:txPr/>
-    <dgm:style>
-      <a:lnRef idx="2">
-        <a:scrgbClr r="0" g="0" b="0"/>
-      </a:lnRef>
-      <a:fillRef idx="1">
-        <a:scrgbClr r="0" g="0" b="0"/>
-      </a:fillRef>
-      <a:effectRef idx="0">
-        <a:scrgbClr r="0" g="0" b="0"/>
-      </a:effectRef>
-      <a:fontRef idx="minor">
-        <a:schemeClr val="lt1"/>
-      </a:fontRef>
-    </dgm:style>
-  </dgm:styleLbl>
-  <dgm:styleLbl name="node3">
-    <dgm:scene3d>
-      <a:camera prst="orthographicFront"/>
-      <a:lightRig rig="threePt" dir="t"/>
-    </dgm:scene3d>
-    <dgm:sp3d/>
-    <dgm:txPr/>
-    <dgm:style>
-      <a:lnRef idx="2">
-        <a:scrgbClr r="0" g="0" b="0"/>
-      </a:lnRef>
-      <a:fillRef idx="1">
-        <a:scrgbClr r="0" g="0" b="0"/>
-      </a:fillRef>
-      <a:effectRef idx="0">
-        <a:scrgbClr r="0" g="0" b="0"/>
-      </a:effectRef>
-      <a:fontRef idx="minor">
-        <a:schemeClr val="lt1"/>
-      </a:fontRef>
-    </dgm:style>
-  </dgm:styleLbl>
-  <dgm:styleLbl name="node4">
-    <dgm:scene3d>
-      <a:camera prst="orthographicFront"/>
-      <a:lightRig rig="threePt" dir="t"/>
-    </dgm:scene3d>
-    <dgm:sp3d/>
-    <dgm:txPr/>
-    <dgm:style>
-      <a:lnRef idx="2">
-        <a:scrgbClr r="0" g="0" b="0"/>
-      </a:lnRef>
-      <a:fillRef idx="1">
-        <a:scrgbClr r="0" g="0" b="0"/>
-      </a:fillRef>
-      <a:effectRef idx="0">
-        <a:scrgbClr r="0" g="0" b="0"/>
-      </a:effectRef>
-      <a:fontRef idx="minor">
-        <a:schemeClr val="lt1"/>
-      </a:fontRef>
-    </dgm:style>
-  </dgm:styleLbl>
-  <dgm:styleLbl name="fgImgPlace1">
-    <dgm:scene3d>
-      <a:camera prst="orthographicFront"/>
-      <a:lightRig rig="threePt" dir="t"/>
-    </dgm:scene3d>
-    <dgm:sp3d/>
-    <dgm:txPr/>
-    <dgm:style>
-      <a:lnRef idx="2">
-        <a:scrgbClr r="0" g="0" b="0"/>
-      </a:lnRef>
-      <a:fillRef idx="1">
-        <a:scrgbClr r="0" g="0" b="0"/>
-      </a:fillRef>
-      <a:effectRef idx="0">
-        <a:scrgbClr r="0" g="0" b="0"/>
-      </a:effectRef>
-      <a:fontRef idx="minor"/>
-    </dgm:style>
-  </dgm:styleLbl>
-  <dgm:styleLbl name="alignImgPlace1">
-    <dgm:scene3d>
-      <a:camera prst="orthographicFront"/>
-      <a:lightRig rig="threePt" dir="t"/>
-    </dgm:scene3d>
-    <dgm:sp3d/>
-    <dgm:txPr/>
-    <dgm:style>
-      <a:lnRef idx="2">
-        <a:scrgbClr r="0" g="0" b="0"/>
-      </a:lnRef>
-      <a:fillRef idx="1">
-        <a:scrgbClr r="0" g="0" b="0"/>
-      </a:fillRef>
-      <a:effectRef idx="0">
-        <a:scrgbClr r="0" g="0" b="0"/>
-      </a:effectRef>
-      <a:fontRef idx="minor"/>
-    </dgm:style>
-  </dgm:styleLbl>
-  <dgm:styleLbl name="bgImgPlace1">
-    <dgm:scene3d>
-      <a:camera prst="orthographicFront"/>
-      <a:lightRig rig="threePt" dir="t"/>
-    </dgm:scene3d>
-    <dgm:sp3d/>
-    <dgm:txPr/>
-    <dgm:style>
-      <a:lnRef idx="2">
-        <a:scrgbClr r="0" g="0" b="0"/>
-      </a:lnRef>
-      <a:fillRef idx="1">
-        <a:scrgbClr r="0" g="0" b="0"/>
-      </a:fillRef>
-      <a:effectRef idx="0">
-        <a:scrgbClr r="0" g="0" b="0"/>
-      </a:effectRef>
-      <a:fontRef idx="minor"/>
-    </dgm:style>
-  </dgm:styleLbl>
-  <dgm:styleLbl name="sibTrans2D1">
-    <dgm:scene3d>
-      <a:camera prst="orthographicFront"/>
-      <a:lightRig rig="threePt" dir="t"/>
-    </dgm:scene3d>
-    <dgm:sp3d/>
-    <dgm:txPr/>
-    <dgm:style>
-      <a:lnRef idx="0">
-        <a:scrgbClr r="0" g="0" b="0"/>
-      </a:lnRef>
-      <a:fillRef idx="1">
-        <a:scrgbClr r="0" g="0" b="0"/>
-      </a:fillRef>
-      <a:effectRef idx="0">
-        <a:scrgbClr r="0" g="0" b="0"/>
-      </a:effectRef>
-      <a:fontRef idx="minor">
-        <a:schemeClr val="lt1"/>
-      </a:fontRef>
-    </dgm:style>
-  </dgm:styleLbl>
-  <dgm:styleLbl name="fgSibTrans2D1">
-    <dgm:scene3d>
-      <a:camera prst="orthographicFront"/>
-      <a:lightRig rig="threePt" dir="t"/>
-    </dgm:scene3d>
-    <dgm:sp3d/>
-    <dgm:txPr/>
-    <dgm:style>
-      <a:lnRef idx="0">
-        <a:scrgbClr r="0" g="0" b="0"/>
-      </a:lnRef>
-      <a:fillRef idx="1">
-        <a:scrgbClr r="0" g="0" b="0"/>
-      </a:fillRef>
-      <a:effectRef idx="0">
-        <a:scrgbClr r="0" g="0" b="0"/>
-      </a:effectRef>
-      <a:fontRef idx="minor">
-        <a:schemeClr val="lt1"/>
-      </a:fontRef>
-    </dgm:style>
-  </dgm:styleLbl>
-  <dgm:styleLbl name="bgSibTrans2D1">
-    <dgm:scene3d>
-      <a:camera prst="orthographicFront"/>
-      <a:lightRig rig="threePt" dir="t"/>
-    </dgm:scene3d>
-    <dgm:sp3d/>
-    <dgm:txPr/>
-    <dgm:style>
-      <a:lnRef idx="0">
-        <a:scrgbClr r="0" g="0" b="0"/>
-      </a:lnRef>
-      <a:fillRef idx="1">
-        <a:scrgbClr r="0" g="0" b="0"/>
-      </a:fillRef>
-      <a:effectRef idx="0">
-        <a:scrgbClr r="0" g="0" b="0"/>
-      </a:effectRef>
-      <a:fontRef idx="minor">
-        <a:schemeClr val="lt1"/>
-      </a:fontRef>
-    </dgm:style>
-  </dgm:styleLbl>
-  <dgm:styleLbl name="sibTrans1D1">
-    <dgm:scene3d>
-      <a:camera prst="orthographicFront"/>
-      <a:lightRig rig="threePt" dir="t"/>
-    </dgm:scene3d>
-    <dgm:sp3d/>
-    <dgm:txPr/>
-    <dgm:style>
-      <a:lnRef idx="1">
-        <a:scrgbClr r="0" g="0" b="0"/>
-      </a:lnRef>
-      <a:fillRef idx="0">
-        <a:scrgbClr r="0" g="0" b="0"/>
-      </a:fillRef>
-      <a:effectRef idx="0">
-        <a:scrgbClr r="0" g="0" b="0"/>
-      </a:effectRef>
-      <a:fontRef idx="minor"/>
-    </dgm:style>
-  </dgm:styleLbl>
-  <dgm:styleLbl name="callout">
-    <dgm:scene3d>
-      <a:camera prst="orthographicFront"/>
-      <a:lightRig rig="threePt" dir="t"/>
-    </dgm:scene3d>
-    <dgm:sp3d/>
-    <dgm:txPr/>
-    <dgm:style>
-      <a:lnRef idx="2">
-        <a:scrgbClr r="0" g="0" b="0"/>
-      </a:lnRef>
-      <a:fillRef idx="1">
-        <a:scrgbClr r="0" g="0" b="0"/>
-      </a:fillRef>
-      <a:effectRef idx="0">
-        <a:scrgbClr r="0" g="0" b="0"/>
-      </a:effectRef>
-      <a:fontRef idx="minor"/>
-    </dgm:style>
-  </dgm:styleLbl>
-  <dgm:styleLbl name="asst0">
-    <dgm:scene3d>
-      <a:camera prst="orthographicFront"/>
-      <a:lightRig rig="threePt" dir="t"/>
-    </dgm:scene3d>
-    <dgm:sp3d/>
-    <dgm:txPr/>
-    <dgm:style>
-      <a:lnRef idx="2">
-        <a:scrgbClr r="0" g="0" b="0"/>
-      </a:lnRef>
-      <a:fillRef idx="1">
-        <a:scrgbClr r="0" g="0" b="0"/>
-      </a:fillRef>
-      <a:effectRef idx="0">
-        <a:scrgbClr r="0" g="0" b="0"/>
-      </a:effectRef>
-      <a:fontRef idx="minor">
-        <a:schemeClr val="lt1"/>
-      </a:fontRef>
-    </dgm:style>
-  </dgm:styleLbl>
-  <dgm:styleLbl name="asst1">
-    <dgm:scene3d>
-      <a:camera prst="orthographicFront"/>
-      <a:lightRig rig="threePt" dir="t"/>
-    </dgm:scene3d>
-    <dgm:sp3d/>
-    <dgm:txPr/>
-    <dgm:style>
-      <a:lnRef idx="2">
-        <a:scrgbClr r="0" g="0" b="0"/>
-      </a:lnRef>
-      <a:fillRef idx="1">
-        <a:scrgbClr r="0" g="0" b="0"/>
-      </a:fillRef>
-      <a:effectRef idx="0">
-        <a:scrgbClr r="0" g="0" b="0"/>
-      </a:effectRef>
-      <a:fontRef idx="minor">
-        <a:schemeClr val="lt1"/>
-      </a:fontRef>
-    </dgm:style>
-  </dgm:styleLbl>
-  <dgm:styleLbl name="asst2">
-    <dgm:scene3d>
-      <a:camera prst="orthographicFront"/>
-      <a:lightRig rig="threePt" dir="t"/>
-    </dgm:scene3d>
-    <dgm:sp3d/>
-    <dgm:txPr/>
-    <dgm:style>
-      <a:lnRef idx="2">
-        <a:scrgbClr r="0" g="0" b="0"/>
-      </a:lnRef>
-      <a:fillRef idx="1">
-        <a:scrgbClr r="0" g="0" b="0"/>
-      </a:fillRef>
-      <a:effectRef idx="0">
-        <a:scrgbClr r="0" g="0" b="0"/>
-      </a:effectRef>
-      <a:fontRef idx="minor">
-        <a:schemeClr val="lt1"/>
-      </a:fontRef>
-    </dgm:style>
-  </dgm:styleLbl>
-  <dgm:styleLbl name="asst3">
-    <dgm:scene3d>
-      <a:camera prst="orthographicFront"/>
-      <a:lightRig rig="threePt" dir="t"/>
-    </dgm:scene3d>
-    <dgm:sp3d/>
-    <dgm:txPr/>
-    <dgm:style>
-      <a:lnRef idx="2">
-        <a:scrgbClr r="0" g="0" b="0"/>
-      </a:lnRef>
-      <a:fillRef idx="1">
-        <a:scrgbClr r="0" g="0" b="0"/>
-      </a:fillRef>
-      <a:effectRef idx="0">
-        <a:scrgbClr r="0" g="0" b="0"/>
-      </a:effectRef>
-      <a:fontRef idx="minor">
-        <a:schemeClr val="lt1"/>
-      </a:fontRef>
-    </dgm:style>
-  </dgm:styleLbl>
-  <dgm:styleLbl name="asst4">
-    <dgm:scene3d>
-      <a:camera prst="orthographicFront"/>
-      <a:lightRig rig="threePt" dir="t"/>
-    </dgm:scene3d>
-    <dgm:sp3d/>
-    <dgm:txPr/>
-    <dgm:style>
-      <a:lnRef idx="2">
-        <a:scrgbClr r="0" g="0" b="0"/>
-      </a:lnRef>
-      <a:fillRef idx="1">
-        <a:scrgbClr r="0" g="0" b="0"/>
-      </a:fillRef>
-      <a:effectRef idx="0">
-        <a:scrgbClr r="0" g="0" b="0"/>
-      </a:effectRef>
-      <a:fontRef idx="minor">
-        <a:schemeClr val="lt1"/>
-      </a:fontRef>
-    </dgm:style>
-  </dgm:styleLbl>
-  <dgm:styleLbl name="parChTrans2D1">
-    <dgm:scene3d>
-      <a:camera prst="orthographicFront"/>
-      <a:lightRig rig="threePt" dir="t"/>
-    </dgm:scene3d>
-    <dgm:sp3d/>
-    <dgm:txPr/>
-    <dgm:style>
-      <a:lnRef idx="2">
-        <a:scrgbClr r="0" g="0" b="0"/>
-      </a:lnRef>
-      <a:fillRef idx="1">
-        <a:scrgbClr r="0" g="0" b="0"/>
-      </a:fillRef>
-      <a:effectRef idx="0">
-        <a:scrgbClr r="0" g="0" b="0"/>
-      </a:effectRef>
-      <a:fontRef idx="minor">
-        <a:schemeClr val="lt1"/>
-      </a:fontRef>
-    </dgm:style>
-  </dgm:styleLbl>
-  <dgm:styleLbl name="parChTrans2D2">
-    <dgm:scene3d>
-      <a:camera prst="orthographicFront"/>
-      <a:lightRig rig="threePt" dir="t"/>
-    </dgm:scene3d>
-    <dgm:sp3d/>
-    <dgm:txPr/>
-    <dgm:style>
-      <a:lnRef idx="2">
-        <a:scrgbClr r="0" g="0" b="0"/>
-      </a:lnRef>
-      <a:fillRef idx="1">
-        <a:scrgbClr r="0" g="0" b="0"/>
-      </a:fillRef>
-      <a:effectRef idx="0">
-        <a:scrgbClr r="0" g="0" b="0"/>
-      </a:effectRef>
-      <a:fontRef idx="minor">
-        <a:schemeClr val="lt1"/>
-      </a:fontRef>
-    </dgm:style>
-  </dgm:styleLbl>
-  <dgm:styleLbl name="parChTrans2D3">
-    <dgm:scene3d>
-      <a:camera prst="orthographicFront"/>
-      <a:lightRig rig="threePt" dir="t"/>
-    </dgm:scene3d>
-    <dgm:sp3d/>
-    <dgm:txPr/>
-    <dgm:style>
-      <a:lnRef idx="2">
-        <a:scrgbClr r="0" g="0" b="0"/>
-      </a:lnRef>
-      <a:fillRef idx="1">
-        <a:scrgbClr r="0" g="0" b="0"/>
-      </a:fillRef>
-      <a:effectRef idx="0">
-        <a:scrgbClr r="0" g="0" b="0"/>
-      </a:effectRef>
-      <a:fontRef idx="minor">
-        <a:schemeClr val="lt1"/>
-      </a:fontRef>
-    </dgm:style>
-  </dgm:styleLbl>
-  <dgm:styleLbl name="parChTrans2D4">
-    <dgm:scene3d>
-      <a:camera prst="orthographicFront"/>
-      <a:lightRig rig="threePt" dir="t"/>
-    </dgm:scene3d>
-    <dgm:sp3d/>
-    <dgm:txPr/>
-    <dgm:style>
-      <a:lnRef idx="2">
-        <a:scrgbClr r="0" g="0" b="0"/>
-      </a:lnRef>
-      <a:fillRef idx="1">
-        <a:scrgbClr r="0" g="0" b="0"/>
-      </a:fillRef>
-      <a:effectRef idx="0">
-        <a:scrgbClr r="0" g="0" b="0"/>
-      </a:effectRef>
-      <a:fontRef idx="minor">
-        <a:schemeClr val="lt1"/>
-      </a:fontRef>
-    </dgm:style>
-  </dgm:styleLbl>
-  <dgm:styleLbl name="parChTrans1D1">
-    <dgm:scene3d>
-      <a:camera prst="orthographicFront"/>
-      <a:lightRig rig="threePt" dir="t"/>
-    </dgm:scene3d>
-    <dgm:sp3d/>
-    <dgm:txPr/>
-    <dgm:style>
-      <a:lnRef idx="2">
-        <a:scrgbClr r="0" g="0" b="0"/>
-      </a:lnRef>
-      <a:fillRef idx="0">
-        <a:scrgbClr r="0" g="0" b="0"/>
-      </a:fillRef>
-      <a:effectRef idx="0">
-        <a:scrgbClr r="0" g="0" b="0"/>
-      </a:effectRef>
-      <a:fontRef idx="minor"/>
-    </dgm:style>
-  </dgm:styleLbl>
-  <dgm:styleLbl name="parChTrans1D2">
-    <dgm:scene3d>
-      <a:camera prst="orthographicFront"/>
-      <a:lightRig rig="threePt" dir="t"/>
-    </dgm:scene3d>
-    <dgm:sp3d/>
-    <dgm:txPr/>
-    <dgm:style>
-      <a:lnRef idx="2">
-        <a:scrgbClr r="0" g="0" b="0"/>
-      </a:lnRef>
-      <a:fillRef idx="0">
-        <a:scrgbClr r="0" g="0" b="0"/>
-      </a:fillRef>
-      <a:effectRef idx="0">
-        <a:scrgbClr r="0" g="0" b="0"/>
-      </a:effectRef>
-      <a:fontRef idx="minor"/>
-    </dgm:style>
-  </dgm:styleLbl>
-  <dgm:styleLbl name="parChTrans1D3">
-    <dgm:scene3d>
-      <a:camera prst="orthographicFront"/>
-      <a:lightRig rig="threePt" dir="t"/>
-    </dgm:scene3d>
-    <dgm:sp3d/>
-    <dgm:txPr/>
-    <dgm:style>
-      <a:lnRef idx="2">
-        <a:scrgbClr r="0" g="0" b="0"/>
-      </a:lnRef>
-      <a:fillRef idx="0">
-        <a:scrgbClr r="0" g="0" b="0"/>
-      </a:fillRef>
-      <a:effectRef idx="0">
-        <a:scrgbClr r="0" g="0" b="0"/>
-      </a:effectRef>
-      <a:fontRef idx="minor"/>
-    </dgm:style>
-  </dgm:styleLbl>
-  <dgm:styleLbl name="parChTrans1D4">
-    <dgm:scene3d>
-      <a:camera prst="orthographicFront"/>
-      <a:lightRig rig="threePt" dir="t"/>
-    </dgm:scene3d>
-    <dgm:sp3d/>
-    <dgm:txPr/>
-    <dgm:style>
-      <a:lnRef idx="2">
-        <a:scrgbClr r="0" g="0" b="0"/>
-      </a:lnRef>
-      <a:fillRef idx="0">
-        <a:scrgbClr r="0" g="0" b="0"/>
-      </a:fillRef>
-      <a:effectRef idx="0">
-        <a:scrgbClr r="0" g="0" b="0"/>
-      </a:effectRef>
-      <a:fontRef idx="minor"/>
-    </dgm:style>
-  </dgm:styleLbl>
-  <dgm:styleLbl name="fgAcc1">
-    <dgm:scene3d>
-      <a:camera prst="orthographicFront"/>
-      <a:lightRig rig="threePt" dir="t"/>
-    </dgm:scene3d>
-    <dgm:sp3d/>
-    <dgm:txPr/>
-    <dgm:style>
-      <a:lnRef idx="2">
-        <a:scrgbClr r="0" g="0" b="0"/>
-      </a:lnRef>
-      <a:fillRef idx="1">
-        <a:scrgbClr r="0" g="0" b="0"/>
-      </a:fillRef>
-      <a:effectRef idx="0">
-        <a:scrgbClr r="0" g="0" b="0"/>
-      </a:effectRef>
-      <a:fontRef idx="minor"/>
-    </dgm:style>
-  </dgm:styleLbl>
-  <dgm:styleLbl name="conFgAcc1">
-    <dgm:scene3d>
-      <a:camera prst="orthographicFront"/>
-      <a:lightRig rig="threePt" dir="t"/>
-    </dgm:scene3d>
-    <dgm:sp3d/>
-    <dgm:txPr/>
-    <dgm:style>
-      <a:lnRef idx="2">
-        <a:scrgbClr r="0" g="0" b="0"/>
-      </a:lnRef>
-      <a:fillRef idx="1">
-        <a:scrgbClr r="0" g="0" b="0"/>
-      </a:fillRef>
-      <a:effectRef idx="0">
-        <a:scrgbClr r="0" g="0" b="0"/>
-      </a:effectRef>
-      <a:fontRef idx="minor"/>
-    </dgm:style>
-  </dgm:styleLbl>
-  <dgm:styleLbl name="alignAcc1">
-    <dgm:scene3d>
-      <a:camera prst="orthographicFront"/>
-      <a:lightRig rig="threePt" dir="t"/>
-    </dgm:scene3d>
-    <dgm:sp3d/>
-    <dgm:txPr/>
-    <dgm:style>
-      <a:lnRef idx="2">
-        <a:scrgbClr r="0" g="0" b="0"/>
-      </a:lnRef>
-      <a:fillRef idx="1">
-        <a:scrgbClr r="0" g="0" b="0"/>
-      </a:fillRef>
-      <a:effectRef idx="0">
-        <a:scrgbClr r="0" g="0" b="0"/>
-      </a:effectRef>
-      <a:fontRef idx="minor"/>
-    </dgm:style>
-  </dgm:styleLbl>
-  <dgm:styleLbl name="trAlignAcc1">
-    <dgm:scene3d>
-      <a:camera prst="orthographicFront"/>
-      <a:lightRig rig="threePt" dir="t"/>
-    </dgm:scene3d>
-    <dgm:sp3d/>
-    <dgm:txPr/>
-    <dgm:style>
-      <a:lnRef idx="1">
-        <a:scrgbClr r="0" g="0" b="0"/>
-      </a:lnRef>
-      <a:fillRef idx="1">
-        <a:scrgbClr r="0" g="0" b="0"/>
-      </a:fillRef>
-      <a:effectRef idx="0">
-        <a:scrgbClr r="0" g="0" b="0"/>
-      </a:effectRef>
-      <a:fontRef idx="minor"/>
-    </dgm:style>
-  </dgm:styleLbl>
-  <dgm:styleLbl name="bgAcc1">
-    <dgm:scene3d>
-      <a:camera prst="orthographicFront"/>
-      <a:lightRig rig="threePt" dir="t"/>
-    </dgm:scene3d>
-    <dgm:sp3d/>
-    <dgm:txPr/>
-    <dgm:style>
-      <a:lnRef idx="2">
-        <a:scrgbClr r="0" g="0" b="0"/>
-      </a:lnRef>
-      <a:fillRef idx="1">
-        <a:scrgbClr r="0" g="0" b="0"/>
-      </a:fillRef>
-      <a:effectRef idx="0">
-        <a:scrgbClr r="0" g="0" b="0"/>
-      </a:effectRef>
-      <a:fontRef idx="minor"/>
-    </dgm:style>
-  </dgm:styleLbl>
-  <dgm:styleLbl name="solidFgAcc1">
-    <dgm:scene3d>
-      <a:camera prst="orthographicFront"/>
-      <a:lightRig rig="threePt" dir="t"/>
-    </dgm:scene3d>
-    <dgm:sp3d/>
-    <dgm:txPr/>
-    <dgm:style>
-      <a:lnRef idx="2">
-        <a:scrgbClr r="0" g="0" b="0"/>
-      </a:lnRef>
-      <a:fillRef idx="1">
-        <a:scrgbClr r="0" g="0" b="0"/>
-      </a:fillRef>
-      <a:effectRef idx="0">
-        <a:scrgbClr r="0" g="0" b="0"/>
-      </a:effectRef>
-      <a:fontRef idx="minor"/>
-    </dgm:style>
-  </dgm:styleLbl>
-  <dgm:styleLbl name="solidAlignAcc1">
-    <dgm:scene3d>
-      <a:camera prst="orthographicFront"/>
-      <a:lightRig rig="threePt" dir="t"/>
-    </dgm:scene3d>
-    <dgm:sp3d/>
-    <dgm:txPr/>
-    <dgm:style>
-      <a:lnRef idx="2">
-        <a:scrgbClr r="0" g="0" b="0"/>
-      </a:lnRef>
-      <a:fillRef idx="1">
-        <a:scrgbClr r="0" g="0" b="0"/>
-      </a:fillRef>
-      <a:effectRef idx="0">
-        <a:scrgbClr r="0" g="0" b="0"/>
-      </a:effectRef>
-      <a:fontRef idx="minor"/>
-    </dgm:style>
-  </dgm:styleLbl>
-  <dgm:styleLbl name="solidBgAcc1">
-    <dgm:scene3d>
-      <a:camera prst="orthographicFront"/>
-      <a:lightRig rig="threePt" dir="t"/>
-    </dgm:scene3d>
-    <dgm:sp3d/>
-    <dgm:txPr/>
-    <dgm:style>
-      <a:lnRef idx="2">
-        <a:scrgbClr r="0" g="0" b="0"/>
-      </a:lnRef>
-      <a:fillRef idx="1">
-        <a:scrgbClr r="0" g="0" b="0"/>
-      </a:fillRef>
-      <a:effectRef idx="0">
-        <a:scrgbClr r="0" g="0" b="0"/>
-      </a:effectRef>
-      <a:fontRef idx="minor"/>
-    </dgm:style>
-  </dgm:styleLbl>
-  <dgm:styleLbl name="fgAccFollowNode1">
-    <dgm:scene3d>
-      <a:camera prst="orthographicFront"/>
-      <a:lightRig rig="threePt" dir="t"/>
-    </dgm:scene3d>
-    <dgm:sp3d/>
-    <dgm:txPr/>
-    <dgm:style>
-      <a:lnRef idx="2">
-        <a:scrgbClr r="0" g="0" b="0"/>
-      </a:lnRef>
-      <a:fillRef idx="1">
-        <a:scrgbClr r="0" g="0" b="0"/>
-      </a:fillRef>
-      <a:effectRef idx="0">
-        <a:scrgbClr r="0" g="0" b="0"/>
-      </a:effectRef>
-      <a:fontRef idx="minor"/>
-    </dgm:style>
-  </dgm:styleLbl>
-  <dgm:styleLbl name="alignAccFollowNode1">
-    <dgm:scene3d>
-      <a:camera prst="orthographicFront"/>
-      <a:lightRig rig="threePt" dir="t"/>
-    </dgm:scene3d>
-    <dgm:sp3d/>
-    <dgm:txPr/>
-    <dgm:style>
-      <a:lnRef idx="2">
-        <a:scrgbClr r="0" g="0" b="0"/>
-      </a:lnRef>
-      <a:fillRef idx="1">
-        <a:scrgbClr r="0" g="0" b="0"/>
-      </a:fillRef>
-      <a:effectRef idx="0">
-        <a:scrgbClr r="0" g="0" b="0"/>
-      </a:effectRef>
-      <a:fontRef idx="minor"/>
-    </dgm:style>
-  </dgm:styleLbl>
-  <dgm:styleLbl name="bgAccFollowNode1">
-    <dgm:scene3d>
-      <a:camera prst="orthographicFront"/>
-      <a:lightRig rig="threePt" dir="t"/>
-    </dgm:scene3d>
-    <dgm:sp3d/>
-    <dgm:txPr/>
-    <dgm:style>
-      <a:lnRef idx="2">
-        <a:scrgbClr r="0" g="0" b="0"/>
-      </a:lnRef>
-      <a:fillRef idx="1">
-        <a:scrgbClr r="0" g="0" b="0"/>
-      </a:fillRef>
-      <a:effectRef idx="0">
-        <a:scrgbClr r="0" g="0" b="0"/>
-      </a:effectRef>
-      <a:fontRef idx="minor"/>
-    </dgm:style>
-  </dgm:styleLbl>
-  <dgm:styleLbl name="fgAcc0">
-    <dgm:scene3d>
-      <a:camera prst="orthographicFront"/>
-      <a:lightRig rig="threePt" dir="t"/>
-    </dgm:scene3d>
-    <dgm:sp3d/>
-    <dgm:txPr/>
-    <dgm:style>
-      <a:lnRef idx="2">
-        <a:scrgbClr r="0" g="0" b="0"/>
-      </a:lnRef>
-      <a:fillRef idx="1">
-        <a:scrgbClr r="0" g="0" b="0"/>
-      </a:fillRef>
-      <a:effectRef idx="0">
-        <a:scrgbClr r="0" g="0" b="0"/>
-      </a:effectRef>
-      <a:fontRef idx="minor"/>
-    </dgm:style>
-  </dgm:styleLbl>
-  <dgm:styleLbl name="fgAcc2">
-    <dgm:scene3d>
-      <a:camera prst="orthographicFront"/>
-      <a:lightRig rig="threePt" dir="t"/>
-    </dgm:scene3d>
-    <dgm:sp3d/>
-    <dgm:txPr/>
-    <dgm:style>
-      <a:lnRef idx="2">
-        <a:scrgbClr r="0" g="0" b="0"/>
-      </a:lnRef>
-      <a:fillRef idx="1">
-        <a:scrgbClr r="0" g="0" b="0"/>
-      </a:fillRef>
-      <a:effectRef idx="0">
-        <a:scrgbClr r="0" g="0" b="0"/>
-      </a:effectRef>
-      <a:fontRef idx="minor"/>
-    </dgm:style>
-  </dgm:styleLbl>
-  <dgm:styleLbl name="fgAcc3">
-    <dgm:scene3d>
-      <a:camera prst="orthographicFront"/>
-      <a:lightRig rig="threePt" dir="t"/>
-    </dgm:scene3d>
-    <dgm:sp3d/>
-    <dgm:txPr/>
-    <dgm:style>
-      <a:lnRef idx="2">
-        <a:scrgbClr r="0" g="0" b="0"/>
-      </a:lnRef>
-      <a:fillRef idx="1">
-        <a:scrgbClr r="0" g="0" b="0"/>
-      </a:fillRef>
-      <a:effectRef idx="0">
-        <a:scrgbClr r="0" g="0" b="0"/>
-      </a:effectRef>
-      <a:fontRef idx="minor"/>
-    </dgm:style>
-  </dgm:styleLbl>
-  <dgm:styleLbl name="fgAcc4">
-    <dgm:scene3d>
-      <a:camera prst="orthographicFront"/>
-      <a:lightRig rig="threePt" dir="t"/>
-    </dgm:scene3d>
-    <dgm:sp3d/>
-    <dgm:txPr/>
-    <dgm:style>
-      <a:lnRef idx="2">
-        <a:scrgbClr r="0" g="0" b="0"/>
-      </a:lnRef>
-      <a:fillRef idx="1">
-        <a:scrgbClr r="0" g="0" b="0"/>
-      </a:fillRef>
-      <a:effectRef idx="0">
-        <a:scrgbClr r="0" g="0" b="0"/>
-      </a:effectRef>
-      <a:fontRef idx="minor"/>
-    </dgm:style>
-  </dgm:styleLbl>
-  <dgm:styleLbl name="bgShp">
-    <dgm:scene3d>
-      <a:camera prst="orthographicFront"/>
-      <a:lightRig rig="threePt" dir="t"/>
-    </dgm:scene3d>
-    <dgm:sp3d/>
-    <dgm:txPr/>
-    <dgm:style>
-      <a:lnRef idx="0">
-        <a:scrgbClr r="0" g="0" b="0"/>
-      </a:lnRef>
-      <a:fillRef idx="1">
-        <a:scrgbClr r="0" g="0" b="0"/>
-      </a:fillRef>
-      <a:effectRef idx="0">
-        <a:scrgbClr r="0" g="0" b="0"/>
-      </a:effectRef>
-      <a:fontRef idx="minor"/>
-    </dgm:style>
-  </dgm:styleLbl>
-  <dgm:styleLbl name="dkBgShp">
-    <dgm:scene3d>
-      <a:camera prst="orthographicFront"/>
-      <a:lightRig rig="threePt" dir="t"/>
-    </dgm:scene3d>
-    <dgm:sp3d/>
-    <dgm:txPr/>
-    <dgm:style>
-      <a:lnRef idx="0">
-        <a:scrgbClr r="0" g="0" b="0"/>
-      </a:lnRef>
-      <a:fillRef idx="1">
-        <a:scrgbClr r="0" g="0" b="0"/>
-      </a:fillRef>
-      <a:effectRef idx="0">
-        <a:scrgbClr r="0" g="0" b="0"/>
-      </a:effectRef>
-      <a:fontRef idx="minor"/>
-    </dgm:style>
-  </dgm:styleLbl>
-  <dgm:styleLbl name="trBgShp">
-    <dgm:scene3d>
-      <a:camera prst="orthographicFront"/>
-      <a:lightRig rig="threePt" dir="t"/>
-    </dgm:scene3d>
-    <dgm:sp3d/>
-    <dgm:txPr/>
-    <dgm:style>
-      <a:lnRef idx="0">
-        <a:scrgbClr r="0" g="0" b="0"/>
-      </a:lnRef>
-      <a:fillRef idx="1">
-        <a:scrgbClr r="0" g="0" b="0"/>
-      </a:fillRef>
-      <a:effectRef idx="0">
-        <a:scrgbClr r="0" g="0" b="0"/>
-      </a:effectRef>
-      <a:fontRef idx="minor"/>
-    </dgm:style>
-  </dgm:styleLbl>
-  <dgm:styleLbl name="fgShp">
-    <dgm:scene3d>
-      <a:camera prst="orthographicFront"/>
-      <a:lightRig rig="threePt" dir="t"/>
-    </dgm:scene3d>
-    <dgm:sp3d/>
-    <dgm:txPr/>
-    <dgm:style>
-      <a:lnRef idx="2">
-        <a:scrgbClr r="0" g="0" b="0"/>
-      </a:lnRef>
-      <a:fillRef idx="1">
-        <a:scrgbClr r="0" g="0" b="0"/>
-      </a:fillRef>
-      <a:effectRef idx="0">
-        <a:scrgbClr r="0" g="0" b="0"/>
-      </a:effectRef>
-      <a:fontRef idx="minor"/>
-    </dgm:style>
-  </dgm:styleLbl>
-  <dgm:styleLbl name="revTx">
-    <dgm:scene3d>
-      <a:camera prst="orthographicFront"/>
-      <a:lightRig rig="threePt" dir="t"/>
-    </dgm:scene3d>
-    <dgm:sp3d/>
-    <dgm:txPr/>
-    <dgm:style>
-      <a:lnRef idx="0">
-        <a:scrgbClr r="0" g="0" b="0"/>
-      </a:lnRef>
-      <a:fillRef idx="0">
-        <a:scrgbClr r="0" g="0" b="0"/>
-      </a:fillRef>
-      <a:effectRef idx="0">
-        <a:scrgbClr r="0" g="0" b="0"/>
-      </a:effectRef>
-      <a:fontRef idx="minor"/>
-    </dgm:style>
-  </dgm:styleLbl>
-</dgm:styleDef>
 </file>
 
 <file path=ppt/slideLayouts/slideLayout1.xml><?xml version="1.0" encoding="utf-8"?>
@@ -7417,37 +4378,110 @@
           </a:p>
         </p:txBody>
       </p:sp>
-      <p:graphicFrame>
-        <p:nvGraphicFramePr>
-          <p:cNvPr id="15" name="Content Placeholder 2">
-            <a:extLst>
-              <a:ext uri="{FF2B5EF4-FFF2-40B4-BE49-F238E27FC236}">
-                <a16:creationId xmlns:a16="http://schemas.microsoft.com/office/drawing/2014/main" id="{FCE60CB2-3F04-BF55-3392-12CFA3AC58DC}"/>
-              </a:ext>
-            </a:extLst>
-          </p:cNvPr>
-          <p:cNvGraphicFramePr>
-            <a:graphicFrameLocks noGrp="1"/>
-          </p:cNvGraphicFramePr>
+      <p:sp>
+        <p:nvSpPr>
+          <p:cNvPr id="39" name="Content Placeholder 38">
+            <a:extLst>
+              <a:ext uri="{FF2B5EF4-FFF2-40B4-BE49-F238E27FC236}">
+                <a16:creationId xmlns:a16="http://schemas.microsoft.com/office/drawing/2014/main" id="{3D4477FA-74FB-E6B9-E8ED-F12086E2D253}"/>
+              </a:ext>
+            </a:extLst>
+          </p:cNvPr>
+          <p:cNvSpPr>
+            <a:spLocks noGrp="1"/>
+          </p:cNvSpPr>
           <p:nvPr>
             <p:ph idx="1"/>
-            <p:extLst>
-              <p:ext uri="{D42A27DB-BD31-4B8C-83A1-F6EECF244321}">
-                <p14:modId xmlns:p14="http://schemas.microsoft.com/office/powerpoint/2010/main" val="4194009429"/>
-              </p:ext>
-            </p:extLst>
-          </p:nvPr>
-        </p:nvGraphicFramePr>
-        <p:xfrm>
-          <a:off x="1430338" y="2286000"/>
-          <a:ext cx="9237662" cy="3810000"/>
-        </p:xfrm>
-        <a:graphic>
-          <a:graphicData uri="http://schemas.openxmlformats.org/drawingml/2006/diagram">
-            <dgm:relIds xmlns:dgm="http://schemas.openxmlformats.org/drawingml/2006/diagram" xmlns:r="http://schemas.openxmlformats.org/officeDocument/2006/relationships" r:dm="rId2" r:lo="rId3" r:qs="rId4" r:cs="rId5"/>
-          </a:graphicData>
-        </a:graphic>
-      </p:graphicFrame>
+          </p:nvPr>
+        </p:nvSpPr>
+        <p:spPr/>
+        <p:txBody>
+          <a:bodyPr vert="horz" lIns="91440" tIns="45720" rIns="91440" bIns="45720" rtlCol="0" anchor="t">
+            <a:normAutofit/>
+          </a:bodyPr>
+          <a:lstStyle/>
+          <a:p>
+            <a:pPr>
+              <a:lnSpc>
+                <a:spcPct val="100000"/>
+              </a:lnSpc>
+              <a:spcBef>
+                <a:spcPts val="0"/>
+              </a:spcBef>
+            </a:pPr>
+            <a:r>
+              <a:rPr lang="en-US" sz="3200" dirty="0">
+                <a:latin typeface="Segoe UI"/>
+                <a:cs typeface="Segoe UI"/>
+              </a:rPr>
+              <a:t>Malware is downloaded accidently</a:t>
+            </a:r>
+          </a:p>
+          <a:p>
+            <a:pPr>
+              <a:lnSpc>
+                <a:spcPct val="100000"/>
+              </a:lnSpc>
+              <a:spcBef>
+                <a:spcPts val="0"/>
+              </a:spcBef>
+            </a:pPr>
+            <a:endParaRPr lang="en-US" sz="3200" dirty="0">
+              <a:latin typeface="Segoe UI"/>
+              <a:cs typeface="Segoe UI"/>
+            </a:endParaRPr>
+          </a:p>
+          <a:p>
+            <a:pPr>
+              <a:lnSpc>
+                <a:spcPct val="100000"/>
+              </a:lnSpc>
+              <a:spcBef>
+                <a:spcPts val="0"/>
+              </a:spcBef>
+            </a:pPr>
+            <a:r>
+              <a:rPr lang="en-US" sz="3200" dirty="0">
+                <a:latin typeface="Segoe UI"/>
+                <a:cs typeface="Segoe UI"/>
+              </a:rPr>
+              <a:t>Theft caused by malware can cost money and computers' capabilities</a:t>
+            </a:r>
+          </a:p>
+          <a:p>
+            <a:pPr>
+              <a:lnSpc>
+                <a:spcPct val="100000"/>
+              </a:lnSpc>
+              <a:spcBef>
+                <a:spcPts val="0"/>
+              </a:spcBef>
+            </a:pPr>
+            <a:endParaRPr lang="en-US" sz="3200" dirty="0">
+              <a:latin typeface="Segoe UI"/>
+              <a:cs typeface="Segoe UI"/>
+            </a:endParaRPr>
+          </a:p>
+          <a:p>
+            <a:pPr>
+              <a:lnSpc>
+                <a:spcPct val="100000"/>
+              </a:lnSpc>
+              <a:spcBef>
+                <a:spcPts val="0"/>
+              </a:spcBef>
+            </a:pPr>
+            <a:r>
+              <a:rPr lang="en-US" sz="3200" dirty="0">
+                <a:latin typeface="Segoe UI"/>
+                <a:cs typeface="Segoe UI"/>
+              </a:rPr>
+              <a:t>Malware can look just like good-ware, but it is misleading</a:t>
+            </a:r>
+            <a:endParaRPr lang="en-US" sz="3200"/>
+          </a:p>
+        </p:txBody>
+      </p:sp>
     </p:spTree>
     <p:extLst>
       <p:ext uri="{BB962C8B-B14F-4D97-AF65-F5344CB8AC3E}">

</xml_diff>